<commit_message>
Updated MS VS projects with latest changes
</commit_message>
<xml_diff>
--- a/documentation/d5o class diagram.pptx
+++ b/documentation/d5o class diagram.pptx
@@ -104,6 +104,11 @@
       </a:defRPr>
     </a:lvl9pPr>
   </p:defaultTextStyle>
+  <p:extLst>
+    <p:ext uri="{EFAFB233-063F-42B5-8137-9DF3F51BA10A}">
+      <p15:sldGuideLst xmlns:p15="http://schemas.microsoft.com/office/powerpoint/2012/main"/>
+    </p:ext>
+  </p:extLst>
 </p:presentation>
 </file>
 
@@ -254,7 +259,7 @@
           <a:p>
             <a:fld id="{A7C4B17A-16AA-42DF-A693-3B255C004AB1}" type="datetimeFigureOut">
               <a:rPr lang="en-US" smtClean="0"/>
-              <a:t>12/5/2022</a:t>
+              <a:t>12/15/2022</a:t>
             </a:fld>
             <a:endParaRPr lang="en-US"/>
           </a:p>
@@ -452,7 +457,7 @@
           <a:p>
             <a:fld id="{A7C4B17A-16AA-42DF-A693-3B255C004AB1}" type="datetimeFigureOut">
               <a:rPr lang="en-US" smtClean="0"/>
-              <a:t>12/5/2022</a:t>
+              <a:t>12/15/2022</a:t>
             </a:fld>
             <a:endParaRPr lang="en-US"/>
           </a:p>
@@ -660,7 +665,7 @@
           <a:p>
             <a:fld id="{A7C4B17A-16AA-42DF-A693-3B255C004AB1}" type="datetimeFigureOut">
               <a:rPr lang="en-US" smtClean="0"/>
-              <a:t>12/5/2022</a:t>
+              <a:t>12/15/2022</a:t>
             </a:fld>
             <a:endParaRPr lang="en-US"/>
           </a:p>
@@ -858,7 +863,7 @@
           <a:p>
             <a:fld id="{A7C4B17A-16AA-42DF-A693-3B255C004AB1}" type="datetimeFigureOut">
               <a:rPr lang="en-US" smtClean="0"/>
-              <a:t>12/5/2022</a:t>
+              <a:t>12/15/2022</a:t>
             </a:fld>
             <a:endParaRPr lang="en-US"/>
           </a:p>
@@ -1133,7 +1138,7 @@
           <a:p>
             <a:fld id="{A7C4B17A-16AA-42DF-A693-3B255C004AB1}" type="datetimeFigureOut">
               <a:rPr lang="en-US" smtClean="0"/>
-              <a:t>12/5/2022</a:t>
+              <a:t>12/15/2022</a:t>
             </a:fld>
             <a:endParaRPr lang="en-US"/>
           </a:p>
@@ -1398,7 +1403,7 @@
           <a:p>
             <a:fld id="{A7C4B17A-16AA-42DF-A693-3B255C004AB1}" type="datetimeFigureOut">
               <a:rPr lang="en-US" smtClean="0"/>
-              <a:t>12/5/2022</a:t>
+              <a:t>12/15/2022</a:t>
             </a:fld>
             <a:endParaRPr lang="en-US"/>
           </a:p>
@@ -1810,7 +1815,7 @@
           <a:p>
             <a:fld id="{A7C4B17A-16AA-42DF-A693-3B255C004AB1}" type="datetimeFigureOut">
               <a:rPr lang="en-US" smtClean="0"/>
-              <a:t>12/5/2022</a:t>
+              <a:t>12/15/2022</a:t>
             </a:fld>
             <a:endParaRPr lang="en-US"/>
           </a:p>
@@ -1951,7 +1956,7 @@
           <a:p>
             <a:fld id="{A7C4B17A-16AA-42DF-A693-3B255C004AB1}" type="datetimeFigureOut">
               <a:rPr lang="en-US" smtClean="0"/>
-              <a:t>12/5/2022</a:t>
+              <a:t>12/15/2022</a:t>
             </a:fld>
             <a:endParaRPr lang="en-US"/>
           </a:p>
@@ -2064,7 +2069,7 @@
           <a:p>
             <a:fld id="{A7C4B17A-16AA-42DF-A693-3B255C004AB1}" type="datetimeFigureOut">
               <a:rPr lang="en-US" smtClean="0"/>
-              <a:t>12/5/2022</a:t>
+              <a:t>12/15/2022</a:t>
             </a:fld>
             <a:endParaRPr lang="en-US"/>
           </a:p>
@@ -2375,7 +2380,7 @@
           <a:p>
             <a:fld id="{A7C4B17A-16AA-42DF-A693-3B255C004AB1}" type="datetimeFigureOut">
               <a:rPr lang="en-US" smtClean="0"/>
-              <a:t>12/5/2022</a:t>
+              <a:t>12/15/2022</a:t>
             </a:fld>
             <a:endParaRPr lang="en-US"/>
           </a:p>
@@ -2663,7 +2668,7 @@
           <a:p>
             <a:fld id="{A7C4B17A-16AA-42DF-A693-3B255C004AB1}" type="datetimeFigureOut">
               <a:rPr lang="en-US" smtClean="0"/>
-              <a:t>12/5/2022</a:t>
+              <a:t>12/15/2022</a:t>
             </a:fld>
             <a:endParaRPr lang="en-US"/>
           </a:p>
@@ -2904,7 +2909,7 @@
           <a:p>
             <a:fld id="{A7C4B17A-16AA-42DF-A693-3B255C004AB1}" type="datetimeFigureOut">
               <a:rPr lang="en-US" smtClean="0"/>
-              <a:t>12/5/2022</a:t>
+              <a:t>12/15/2022</a:t>
             </a:fld>
             <a:endParaRPr lang="en-US"/>
           </a:p>

</xml_diff>

<commit_message>
Qstatement, Qblock, Qroutine & Qbinder added. Qassign and Qexpression specializations of Qstatement in support of Qblock functionality. Qcell and Qbit solution functionality consolidated in support of Qbinder Qnary defualt resize value changed from 0 to superposition Qwhole assignment operators updated UTestQbin updated to use Qblock and Qbinder UTestQwhole added
</commit_message>
<xml_diff>
--- a/documentation/d5o class diagram.pptx
+++ b/documentation/d5o class diagram.pptx
@@ -259,7 +259,7 @@
           <a:p>
             <a:fld id="{A7C4B17A-16AA-42DF-A693-3B255C004AB1}" type="datetimeFigureOut">
               <a:rPr lang="en-US" smtClean="0"/>
-              <a:t>12/15/2022</a:t>
+              <a:t>1/4/2023</a:t>
             </a:fld>
             <a:endParaRPr lang="en-US"/>
           </a:p>
@@ -457,7 +457,7 @@
           <a:p>
             <a:fld id="{A7C4B17A-16AA-42DF-A693-3B255C004AB1}" type="datetimeFigureOut">
               <a:rPr lang="en-US" smtClean="0"/>
-              <a:t>12/15/2022</a:t>
+              <a:t>1/4/2023</a:t>
             </a:fld>
             <a:endParaRPr lang="en-US"/>
           </a:p>
@@ -665,7 +665,7 @@
           <a:p>
             <a:fld id="{A7C4B17A-16AA-42DF-A693-3B255C004AB1}" type="datetimeFigureOut">
               <a:rPr lang="en-US" smtClean="0"/>
-              <a:t>12/15/2022</a:t>
+              <a:t>1/4/2023</a:t>
             </a:fld>
             <a:endParaRPr lang="en-US"/>
           </a:p>
@@ -863,7 +863,7 @@
           <a:p>
             <a:fld id="{A7C4B17A-16AA-42DF-A693-3B255C004AB1}" type="datetimeFigureOut">
               <a:rPr lang="en-US" smtClean="0"/>
-              <a:t>12/15/2022</a:t>
+              <a:t>1/4/2023</a:t>
             </a:fld>
             <a:endParaRPr lang="en-US"/>
           </a:p>
@@ -1138,7 +1138,7 @@
           <a:p>
             <a:fld id="{A7C4B17A-16AA-42DF-A693-3B255C004AB1}" type="datetimeFigureOut">
               <a:rPr lang="en-US" smtClean="0"/>
-              <a:t>12/15/2022</a:t>
+              <a:t>1/4/2023</a:t>
             </a:fld>
             <a:endParaRPr lang="en-US"/>
           </a:p>
@@ -1403,7 +1403,7 @@
           <a:p>
             <a:fld id="{A7C4B17A-16AA-42DF-A693-3B255C004AB1}" type="datetimeFigureOut">
               <a:rPr lang="en-US" smtClean="0"/>
-              <a:t>12/15/2022</a:t>
+              <a:t>1/4/2023</a:t>
             </a:fld>
             <a:endParaRPr lang="en-US"/>
           </a:p>
@@ -1815,7 +1815,7 @@
           <a:p>
             <a:fld id="{A7C4B17A-16AA-42DF-A693-3B255C004AB1}" type="datetimeFigureOut">
               <a:rPr lang="en-US" smtClean="0"/>
-              <a:t>12/15/2022</a:t>
+              <a:t>1/4/2023</a:t>
             </a:fld>
             <a:endParaRPr lang="en-US"/>
           </a:p>
@@ -1956,7 +1956,7 @@
           <a:p>
             <a:fld id="{A7C4B17A-16AA-42DF-A693-3B255C004AB1}" type="datetimeFigureOut">
               <a:rPr lang="en-US" smtClean="0"/>
-              <a:t>12/15/2022</a:t>
+              <a:t>1/4/2023</a:t>
             </a:fld>
             <a:endParaRPr lang="en-US"/>
           </a:p>
@@ -2069,7 +2069,7 @@
           <a:p>
             <a:fld id="{A7C4B17A-16AA-42DF-A693-3B255C004AB1}" type="datetimeFigureOut">
               <a:rPr lang="en-US" smtClean="0"/>
-              <a:t>12/15/2022</a:t>
+              <a:t>1/4/2023</a:t>
             </a:fld>
             <a:endParaRPr lang="en-US"/>
           </a:p>
@@ -2380,7 +2380,7 @@
           <a:p>
             <a:fld id="{A7C4B17A-16AA-42DF-A693-3B255C004AB1}" type="datetimeFigureOut">
               <a:rPr lang="en-US" smtClean="0"/>
-              <a:t>12/15/2022</a:t>
+              <a:t>1/4/2023</a:t>
             </a:fld>
             <a:endParaRPr lang="en-US"/>
           </a:p>
@@ -2668,7 +2668,7 @@
           <a:p>
             <a:fld id="{A7C4B17A-16AA-42DF-A693-3B255C004AB1}" type="datetimeFigureOut">
               <a:rPr lang="en-US" smtClean="0"/>
-              <a:t>12/15/2022</a:t>
+              <a:t>1/4/2023</a:t>
             </a:fld>
             <a:endParaRPr lang="en-US"/>
           </a:p>
@@ -2909,7 +2909,7 @@
           <a:p>
             <a:fld id="{A7C4B17A-16AA-42DF-A693-3B255C004AB1}" type="datetimeFigureOut">
               <a:rPr lang="en-US" smtClean="0"/>
-              <a:t>12/15/2022</a:t>
+              <a:t>1/4/2023</a:t>
             </a:fld>
             <a:endParaRPr lang="en-US"/>
           </a:p>

</xml_diff>

<commit_message>
Qassignment copy constructor correction and class diagram update
</commit_message>
<xml_diff>
--- a/documentation/d5o class diagram.pptx
+++ b/documentation/d5o class diagram.pptx
@@ -259,7 +259,7 @@
           <a:p>
             <a:fld id="{A7C4B17A-16AA-42DF-A693-3B255C004AB1}" type="datetimeFigureOut">
               <a:rPr lang="en-US" smtClean="0"/>
-              <a:t>11/8/23</a:t>
+              <a:t>2/13/2024</a:t>
             </a:fld>
             <a:endParaRPr lang="en-US"/>
           </a:p>
@@ -457,7 +457,7 @@
           <a:p>
             <a:fld id="{A7C4B17A-16AA-42DF-A693-3B255C004AB1}" type="datetimeFigureOut">
               <a:rPr lang="en-US" smtClean="0"/>
-              <a:t>11/8/23</a:t>
+              <a:t>2/13/2024</a:t>
             </a:fld>
             <a:endParaRPr lang="en-US"/>
           </a:p>
@@ -665,7 +665,7 @@
           <a:p>
             <a:fld id="{A7C4B17A-16AA-42DF-A693-3B255C004AB1}" type="datetimeFigureOut">
               <a:rPr lang="en-US" smtClean="0"/>
-              <a:t>11/8/23</a:t>
+              <a:t>2/13/2024</a:t>
             </a:fld>
             <a:endParaRPr lang="en-US"/>
           </a:p>
@@ -863,7 +863,7 @@
           <a:p>
             <a:fld id="{A7C4B17A-16AA-42DF-A693-3B255C004AB1}" type="datetimeFigureOut">
               <a:rPr lang="en-US" smtClean="0"/>
-              <a:t>11/8/23</a:t>
+              <a:t>2/13/2024</a:t>
             </a:fld>
             <a:endParaRPr lang="en-US"/>
           </a:p>
@@ -1138,7 +1138,7 @@
           <a:p>
             <a:fld id="{A7C4B17A-16AA-42DF-A693-3B255C004AB1}" type="datetimeFigureOut">
               <a:rPr lang="en-US" smtClean="0"/>
-              <a:t>11/8/23</a:t>
+              <a:t>2/13/2024</a:t>
             </a:fld>
             <a:endParaRPr lang="en-US"/>
           </a:p>
@@ -1403,7 +1403,7 @@
           <a:p>
             <a:fld id="{A7C4B17A-16AA-42DF-A693-3B255C004AB1}" type="datetimeFigureOut">
               <a:rPr lang="en-US" smtClean="0"/>
-              <a:t>11/8/23</a:t>
+              <a:t>2/13/2024</a:t>
             </a:fld>
             <a:endParaRPr lang="en-US"/>
           </a:p>
@@ -1815,7 +1815,7 @@
           <a:p>
             <a:fld id="{A7C4B17A-16AA-42DF-A693-3B255C004AB1}" type="datetimeFigureOut">
               <a:rPr lang="en-US" smtClean="0"/>
-              <a:t>11/8/23</a:t>
+              <a:t>2/13/2024</a:t>
             </a:fld>
             <a:endParaRPr lang="en-US"/>
           </a:p>
@@ -1956,7 +1956,7 @@
           <a:p>
             <a:fld id="{A7C4B17A-16AA-42DF-A693-3B255C004AB1}" type="datetimeFigureOut">
               <a:rPr lang="en-US" smtClean="0"/>
-              <a:t>11/8/23</a:t>
+              <a:t>2/13/2024</a:t>
             </a:fld>
             <a:endParaRPr lang="en-US"/>
           </a:p>
@@ -2069,7 +2069,7 @@
           <a:p>
             <a:fld id="{A7C4B17A-16AA-42DF-A693-3B255C004AB1}" type="datetimeFigureOut">
               <a:rPr lang="en-US" smtClean="0"/>
-              <a:t>11/8/23</a:t>
+              <a:t>2/13/2024</a:t>
             </a:fld>
             <a:endParaRPr lang="en-US"/>
           </a:p>
@@ -2380,7 +2380,7 @@
           <a:p>
             <a:fld id="{A7C4B17A-16AA-42DF-A693-3B255C004AB1}" type="datetimeFigureOut">
               <a:rPr lang="en-US" smtClean="0"/>
-              <a:t>11/8/23</a:t>
+              <a:t>2/13/2024</a:t>
             </a:fld>
             <a:endParaRPr lang="en-US"/>
           </a:p>
@@ -2668,7 +2668,7 @@
           <a:p>
             <a:fld id="{A7C4B17A-16AA-42DF-A693-3B255C004AB1}" type="datetimeFigureOut">
               <a:rPr lang="en-US" smtClean="0"/>
-              <a:t>11/8/23</a:t>
+              <a:t>2/13/2024</a:t>
             </a:fld>
             <a:endParaRPr lang="en-US"/>
           </a:p>
@@ -2909,7 +2909,7 @@
           <a:p>
             <a:fld id="{A7C4B17A-16AA-42DF-A693-3B255C004AB1}" type="datetimeFigureOut">
               <a:rPr lang="en-US" smtClean="0"/>
-              <a:t>11/8/23</a:t>
+              <a:t>2/13/2024</a:t>
             </a:fld>
             <a:endParaRPr lang="en-US"/>
           </a:p>
@@ -3344,8 +3344,8 @@
         </p:nvCxnSpPr>
         <p:spPr>
           <a:xfrm rot="5400000" flipH="1" flipV="1">
-            <a:off x="3815392" y="1962927"/>
-            <a:ext cx="842721" cy="2359507"/>
+            <a:off x="3957128" y="1583533"/>
+            <a:ext cx="601509" cy="2559843"/>
           </a:xfrm>
           <a:prstGeom prst="bentConnector3">
             <a:avLst>
@@ -3385,7 +3385,7 @@
         </p:nvSpPr>
         <p:spPr>
           <a:xfrm>
-            <a:off x="333928" y="4260951"/>
+            <a:off x="455226" y="4102331"/>
             <a:ext cx="463780" cy="276999"/>
           </a:xfrm>
           <a:prstGeom prst="rect">
@@ -3436,7 +3436,7 @@
         </p:nvSpPr>
         <p:spPr>
           <a:xfrm>
-            <a:off x="679403" y="3280300"/>
+            <a:off x="800701" y="3121680"/>
             <a:ext cx="495650" cy="276999"/>
           </a:xfrm>
           <a:prstGeom prst="rect">
@@ -3491,7 +3491,7 @@
         </p:nvCxnSpPr>
         <p:spPr>
           <a:xfrm flipV="1">
-            <a:off x="797708" y="3557299"/>
+            <a:off x="919006" y="3398679"/>
             <a:ext cx="129520" cy="842152"/>
           </a:xfrm>
           <a:prstGeom prst="bentConnector2">
@@ -3530,7 +3530,7 @@
         </p:nvSpPr>
         <p:spPr>
           <a:xfrm>
-            <a:off x="1780532" y="2453556"/>
+            <a:off x="1901830" y="2294936"/>
             <a:ext cx="576504" cy="276999"/>
           </a:xfrm>
           <a:prstGeom prst="rect">
@@ -3581,7 +3581,7 @@
         </p:nvSpPr>
         <p:spPr>
           <a:xfrm>
-            <a:off x="3096912" y="1505390"/>
+            <a:off x="3218210" y="1346770"/>
             <a:ext cx="497701" cy="276999"/>
           </a:xfrm>
           <a:prstGeom prst="rect">
@@ -3635,7 +3635,7 @@
         </p:nvCxnSpPr>
         <p:spPr>
           <a:xfrm rot="5400000" flipH="1" flipV="1">
-            <a:off x="2371690" y="1479484"/>
+            <a:off x="2492988" y="1320864"/>
             <a:ext cx="671167" cy="1276979"/>
           </a:xfrm>
           <a:prstGeom prst="bentConnector3">
@@ -3674,7 +3674,7 @@
         </p:nvSpPr>
         <p:spPr>
           <a:xfrm>
-            <a:off x="440200" y="2434260"/>
+            <a:off x="561498" y="2275640"/>
             <a:ext cx="575799" cy="276999"/>
           </a:xfrm>
           <a:prstGeom prst="rect">
@@ -3725,7 +3725,7 @@
         </p:nvSpPr>
         <p:spPr>
           <a:xfrm>
-            <a:off x="1330056" y="3382524"/>
+            <a:off x="1376706" y="3223904"/>
             <a:ext cx="465192" cy="276999"/>
           </a:xfrm>
           <a:prstGeom prst="rect">
@@ -3778,8 +3778,8 @@
         </p:nvCxnSpPr>
         <p:spPr>
           <a:xfrm rot="16200000" flipV="1">
-            <a:off x="809744" y="2629616"/>
-            <a:ext cx="671265" cy="834552"/>
+            <a:off x="893718" y="2508320"/>
+            <a:ext cx="671265" cy="759904"/>
           </a:xfrm>
           <a:prstGeom prst="bentConnector3">
             <a:avLst/>
@@ -3817,7 +3817,7 @@
         </p:nvSpPr>
         <p:spPr>
           <a:xfrm>
-            <a:off x="3249757" y="2444320"/>
+            <a:off x="3371055" y="2285700"/>
             <a:ext cx="508474" cy="276999"/>
           </a:xfrm>
           <a:prstGeom prst="rect">
@@ -3868,7 +3868,7 @@
         </p:nvSpPr>
         <p:spPr>
           <a:xfrm>
-            <a:off x="1862027" y="3387142"/>
+            <a:off x="1908677" y="3228522"/>
             <a:ext cx="579005" cy="276999"/>
           </a:xfrm>
           <a:prstGeom prst="rect">
@@ -3923,8 +3923,8 @@
         </p:nvCxnSpPr>
         <p:spPr>
           <a:xfrm rot="5400000" flipH="1" flipV="1">
-            <a:off x="2494851" y="2377999"/>
-            <a:ext cx="665823" cy="1352464"/>
+            <a:off x="2578825" y="2182055"/>
+            <a:ext cx="665823" cy="1427112"/>
           </a:xfrm>
           <a:prstGeom prst="bentConnector3">
             <a:avLst>
@@ -3968,8 +3968,8 @@
         </p:nvCxnSpPr>
         <p:spPr>
           <a:xfrm rot="5400000" flipH="1" flipV="1">
-            <a:off x="2202721" y="2081251"/>
-            <a:ext cx="661205" cy="1941342"/>
+            <a:off x="2286695" y="1885307"/>
+            <a:ext cx="661205" cy="2015990"/>
           </a:xfrm>
           <a:prstGeom prst="bentConnector3">
             <a:avLst>
@@ -4013,7 +4013,7 @@
         </p:nvCxnSpPr>
         <p:spPr>
           <a:xfrm rot="16200000" flipV="1">
-            <a:off x="3093914" y="2034239"/>
+            <a:off x="3215212" y="1875619"/>
             <a:ext cx="661931" cy="158231"/>
           </a:xfrm>
           <a:prstGeom prst="bentConnector3">
@@ -4054,7 +4054,7 @@
         </p:nvSpPr>
         <p:spPr>
           <a:xfrm>
-            <a:off x="5187917" y="2444320"/>
+            <a:off x="5309215" y="2285700"/>
             <a:ext cx="457177" cy="276999"/>
           </a:xfrm>
           <a:prstGeom prst="rect">
@@ -4105,7 +4105,7 @@
         </p:nvSpPr>
         <p:spPr>
           <a:xfrm>
-            <a:off x="150610" y="3898894"/>
+            <a:off x="271908" y="3740274"/>
             <a:ext cx="688009" cy="276999"/>
           </a:xfrm>
           <a:prstGeom prst="rect">
@@ -4160,7 +4160,7 @@
         </p:nvCxnSpPr>
         <p:spPr>
           <a:xfrm flipV="1">
-            <a:off x="838619" y="3557299"/>
+            <a:off x="959917" y="3398679"/>
             <a:ext cx="88609" cy="480095"/>
           </a:xfrm>
           <a:prstGeom prst="bentConnector2">
@@ -4199,7 +4199,7 @@
         </p:nvSpPr>
         <p:spPr>
           <a:xfrm>
-            <a:off x="2674971" y="3564040"/>
+            <a:off x="2595933" y="3164208"/>
             <a:ext cx="764056" cy="276999"/>
           </a:xfrm>
           <a:prstGeom prst="rect">
@@ -4250,7 +4250,7 @@
         </p:nvSpPr>
         <p:spPr>
           <a:xfrm>
-            <a:off x="5185604" y="3413921"/>
+            <a:off x="5306902" y="3133124"/>
             <a:ext cx="696024" cy="276999"/>
           </a:xfrm>
           <a:prstGeom prst="rect">
@@ -4304,8 +4304,8 @@
         </p:nvCxnSpPr>
         <p:spPr>
           <a:xfrm rot="16200000" flipV="1">
-            <a:off x="2146150" y="2653190"/>
-            <a:ext cx="833485" cy="988215"/>
+            <a:off x="2287886" y="2474132"/>
+            <a:ext cx="592273" cy="787879"/>
           </a:xfrm>
           <a:prstGeom prst="bentConnector3">
             <a:avLst/>
@@ -4346,8 +4346,8 @@
         </p:nvCxnSpPr>
         <p:spPr>
           <a:xfrm rot="16200000" flipV="1">
-            <a:off x="5128760" y="3009065"/>
-            <a:ext cx="692602" cy="117110"/>
+            <a:off x="5311147" y="2789357"/>
+            <a:ext cx="570425" cy="117110"/>
           </a:xfrm>
           <a:prstGeom prst="bentConnector3">
             <a:avLst>
@@ -4391,8 +4391,8 @@
         </p:nvCxnSpPr>
         <p:spPr>
           <a:xfrm rot="16200000" flipV="1">
-            <a:off x="4172504" y="2052809"/>
-            <a:ext cx="692602" cy="2029622"/>
+            <a:off x="4354891" y="1833101"/>
+            <a:ext cx="570425" cy="2029622"/>
           </a:xfrm>
           <a:prstGeom prst="bentConnector3">
             <a:avLst>
@@ -4432,7 +4432,7 @@
         </p:nvSpPr>
         <p:spPr>
           <a:xfrm>
-            <a:off x="2469566" y="4027870"/>
+            <a:off x="2401091" y="3869250"/>
             <a:ext cx="532518" cy="276999"/>
           </a:xfrm>
           <a:prstGeom prst="rect">
@@ -4487,8 +4487,8 @@
         </p:nvCxnSpPr>
         <p:spPr>
           <a:xfrm flipV="1">
-            <a:off x="3002084" y="3841039"/>
-            <a:ext cx="54915" cy="325331"/>
+            <a:off x="2933609" y="3441207"/>
+            <a:ext cx="44352" cy="566543"/>
           </a:xfrm>
           <a:prstGeom prst="bentConnector2">
             <a:avLst/>
@@ -4526,7 +4526,7 @@
         </p:nvGrpSpPr>
         <p:grpSpPr>
           <a:xfrm>
-            <a:off x="9029841" y="1940772"/>
+            <a:off x="9151139" y="1782152"/>
             <a:ext cx="985021" cy="513078"/>
             <a:chOff x="6749231" y="1757230"/>
             <a:chExt cx="985021" cy="513078"/>
@@ -4665,7 +4665,7 @@
         </p:nvSpPr>
         <p:spPr>
           <a:xfrm>
-            <a:off x="8843142" y="1505390"/>
+            <a:off x="8964440" y="1346770"/>
             <a:ext cx="1046768" cy="276999"/>
           </a:xfrm>
           <a:prstGeom prst="rect">
@@ -4720,7 +4720,7 @@
         </p:nvCxnSpPr>
         <p:spPr>
           <a:xfrm rot="16200000" flipV="1">
-            <a:off x="9171753" y="1977162"/>
+            <a:off x="9293051" y="1818542"/>
             <a:ext cx="394462" cy="4915"/>
           </a:xfrm>
           <a:prstGeom prst="bentConnector3">
@@ -4766,7 +4766,7 @@
         </p:nvGrpSpPr>
         <p:grpSpPr>
           <a:xfrm>
-            <a:off x="7122059" y="3008123"/>
+            <a:off x="7243357" y="2849503"/>
             <a:ext cx="930102" cy="513078"/>
             <a:chOff x="6804150" y="1757230"/>
             <a:chExt cx="930102" cy="513078"/>
@@ -4905,7 +4905,7 @@
         </p:nvSpPr>
         <p:spPr>
           <a:xfrm>
-            <a:off x="6918950" y="2431261"/>
+            <a:off x="7040248" y="2272641"/>
             <a:ext cx="985434" cy="276999"/>
           </a:xfrm>
           <a:prstGeom prst="rect">
@@ -4960,7 +4960,7 @@
         </p:nvCxnSpPr>
         <p:spPr>
           <a:xfrm rot="5400000" flipH="1" flipV="1">
-            <a:off x="7142233" y="2974768"/>
+            <a:off x="7263531" y="2816148"/>
             <a:ext cx="535942" cy="2926"/>
           </a:xfrm>
           <a:prstGeom prst="bentConnector3">
@@ -5006,9 +5006,9 @@
         </p:nvGrpSpPr>
         <p:grpSpPr>
           <a:xfrm>
-            <a:off x="7904384" y="1643889"/>
+            <a:off x="8025682" y="1485269"/>
             <a:ext cx="938758" cy="925871"/>
-            <a:chOff x="6791408" y="815107"/>
+            <a:chOff x="6912706" y="656487"/>
             <a:chExt cx="938758" cy="925871"/>
           </a:xfrm>
         </p:grpSpPr>
@@ -5030,7 +5030,7 @@
           </p:nvCxnSpPr>
           <p:spPr>
             <a:xfrm rot="10800000" flipV="1">
-              <a:off x="6791408" y="815107"/>
+              <a:off x="6912706" y="656487"/>
               <a:ext cx="938758" cy="925871"/>
             </a:xfrm>
             <a:prstGeom prst="bentConnector3">
@@ -5106,9 +5106,9 @@
         </p:nvGrpSpPr>
         <p:grpSpPr>
           <a:xfrm>
-            <a:off x="3594613" y="1423198"/>
+            <a:off x="3715911" y="1264578"/>
             <a:ext cx="5248529" cy="253916"/>
-            <a:chOff x="2988073" y="594416"/>
+            <a:chOff x="3109371" y="594416"/>
             <a:chExt cx="5248529" cy="253916"/>
           </a:xfrm>
         </p:grpSpPr>
@@ -5130,7 +5130,7 @@
           </p:nvCxnSpPr>
           <p:spPr>
             <a:xfrm flipH="1">
-              <a:off x="2988073" y="815108"/>
+              <a:off x="3109371" y="656488"/>
               <a:ext cx="5248529" cy="0"/>
             </a:xfrm>
             <a:prstGeom prst="line">
@@ -5210,7 +5210,7 @@
         </p:nvCxnSpPr>
         <p:spPr>
           <a:xfrm rot="10800000">
-            <a:off x="3594613" y="1643890"/>
+            <a:off x="3715911" y="1485270"/>
             <a:ext cx="1593304" cy="938930"/>
           </a:xfrm>
           <a:prstGeom prst="bentConnector3">
@@ -5251,7 +5251,7 @@
         </p:nvSpPr>
         <p:spPr>
           <a:xfrm>
-            <a:off x="6183611" y="970993"/>
+            <a:off x="6304909" y="784380"/>
             <a:ext cx="974475" cy="253916"/>
           </a:xfrm>
           <a:prstGeom prst="rect">
@@ -5287,7 +5287,7 @@
         </p:nvSpPr>
         <p:spPr>
           <a:xfrm>
-            <a:off x="4587737" y="2157223"/>
+            <a:off x="4709035" y="1998603"/>
             <a:ext cx="836227" cy="415498"/>
           </a:xfrm>
           <a:prstGeom prst="rect">
@@ -5333,10 +5333,10 @@
         </p:nvGrpSpPr>
         <p:grpSpPr>
           <a:xfrm>
-            <a:off x="5645094" y="2349069"/>
-            <a:ext cx="1350222" cy="253916"/>
-            <a:chOff x="5003730" y="1520287"/>
-            <a:chExt cx="1350222" cy="253916"/>
+            <a:off x="5766392" y="2190449"/>
+            <a:ext cx="1273856" cy="253916"/>
+            <a:chOff x="5125028" y="1520287"/>
+            <a:chExt cx="1273856" cy="253916"/>
           </a:xfrm>
         </p:grpSpPr>
         <p:cxnSp>
@@ -5357,7 +5357,7 @@
           </p:nvCxnSpPr>
           <p:spPr>
             <a:xfrm flipH="1">
-              <a:off x="5003730" y="1740979"/>
+              <a:off x="5125028" y="1582359"/>
               <a:ext cx="1273856" cy="13059"/>
             </a:xfrm>
             <a:prstGeom prst="line">
@@ -5433,7 +5433,7 @@
         </p:nvSpPr>
         <p:spPr>
           <a:xfrm>
-            <a:off x="8217025" y="3212262"/>
+            <a:off x="8338323" y="3053642"/>
             <a:ext cx="965714" cy="276999"/>
           </a:xfrm>
           <a:prstGeom prst="rect">
@@ -5484,7 +5484,7 @@
         </p:nvSpPr>
         <p:spPr>
           <a:xfrm>
-            <a:off x="3936200" y="1889379"/>
+            <a:off x="4057498" y="1730759"/>
             <a:ext cx="634468" cy="276999"/>
           </a:xfrm>
           <a:prstGeom prst="rect">
@@ -5535,10 +5535,10 @@
         </p:nvGrpSpPr>
         <p:grpSpPr>
           <a:xfrm>
-            <a:off x="3758231" y="2166378"/>
-            <a:ext cx="892417" cy="435042"/>
-            <a:chOff x="7637390" y="-25168"/>
-            <a:chExt cx="892417" cy="435042"/>
+            <a:off x="3879529" y="2007758"/>
+            <a:ext cx="820431" cy="593662"/>
+            <a:chOff x="7709376" y="-183788"/>
+            <a:chExt cx="820431" cy="593662"/>
           </a:xfrm>
         </p:grpSpPr>
         <p:cxnSp>
@@ -5559,7 +5559,7 @@
           </p:nvCxnSpPr>
           <p:spPr>
             <a:xfrm flipV="1">
-              <a:off x="7637390" y="-25168"/>
+              <a:off x="7758688" y="-183788"/>
               <a:ext cx="495203" cy="416442"/>
             </a:xfrm>
             <a:prstGeom prst="bentConnector2">
@@ -5635,10 +5635,10 @@
         </p:nvGrpSpPr>
         <p:grpSpPr>
           <a:xfrm>
-            <a:off x="2357036" y="2362306"/>
-            <a:ext cx="953563" cy="253916"/>
-            <a:chOff x="1598096" y="1381124"/>
-            <a:chExt cx="953563" cy="253916"/>
+            <a:off x="2478336" y="2380970"/>
+            <a:ext cx="906396" cy="253916"/>
+            <a:chOff x="1692982" y="1381124"/>
+            <a:chExt cx="919133" cy="253916"/>
           </a:xfrm>
         </p:grpSpPr>
         <p:cxnSp>
@@ -5659,7 +5659,7 @@
           </p:nvCxnSpPr>
           <p:spPr>
             <a:xfrm flipV="1">
-              <a:off x="1598096" y="1601638"/>
+              <a:off x="1719394" y="1443018"/>
               <a:ext cx="892721" cy="9236"/>
             </a:xfrm>
             <a:prstGeom prst="line">
@@ -5698,8 +5698,8 @@
           </p:nvSpPr>
           <p:spPr>
             <a:xfrm>
-              <a:off x="1692981" y="1381124"/>
-              <a:ext cx="858678" cy="253916"/>
+              <a:off x="1692982" y="1381124"/>
+              <a:ext cx="600180" cy="253916"/>
             </a:xfrm>
             <a:prstGeom prst="rect">
               <a:avLst/>
@@ -5738,7 +5738,7 @@
         </p:nvCxnSpPr>
         <p:spPr>
           <a:xfrm rot="5400000" flipH="1" flipV="1">
-            <a:off x="1223134" y="2434650"/>
+            <a:off x="1344432" y="2276030"/>
             <a:ext cx="549745" cy="1141556"/>
           </a:xfrm>
           <a:prstGeom prst="bentConnector3">
@@ -5780,7 +5780,7 @@
         </p:nvCxnSpPr>
         <p:spPr>
           <a:xfrm rot="16200000" flipV="1">
-            <a:off x="543144" y="2896216"/>
+            <a:off x="664442" y="2737596"/>
             <a:ext cx="569041" cy="199128"/>
           </a:xfrm>
           <a:prstGeom prst="bentConnector3">
@@ -5819,7 +5819,7 @@
         </p:nvSpPr>
         <p:spPr>
           <a:xfrm>
-            <a:off x="2085441" y="4382128"/>
+            <a:off x="2016966" y="4223508"/>
             <a:ext cx="907888" cy="276999"/>
           </a:xfrm>
           <a:prstGeom prst="rect">
@@ -5874,8 +5874,8 @@
         </p:nvCxnSpPr>
         <p:spPr>
           <a:xfrm flipV="1">
-            <a:off x="2993329" y="3841039"/>
-            <a:ext cx="63670" cy="679589"/>
+            <a:off x="2924854" y="3441207"/>
+            <a:ext cx="53107" cy="920801"/>
           </a:xfrm>
           <a:prstGeom prst="bentConnector2">
             <a:avLst/>
@@ -5913,7 +5913,7 @@
         </p:nvSpPr>
         <p:spPr>
           <a:xfrm>
-            <a:off x="3496529" y="3982693"/>
+            <a:off x="1139344" y="3896772"/>
             <a:ext cx="962316" cy="276999"/>
           </a:xfrm>
           <a:prstGeom prst="rect">
@@ -5964,7 +5964,7 @@
         </p:nvSpPr>
         <p:spPr>
           <a:xfrm>
-            <a:off x="2979117" y="4729861"/>
+            <a:off x="348666" y="4863109"/>
             <a:ext cx="813877" cy="276999"/>
           </a:xfrm>
           <a:prstGeom prst="rect">
@@ -6019,8 +6019,8 @@
         </p:nvCxnSpPr>
         <p:spPr>
           <a:xfrm flipV="1">
-            <a:off x="3792994" y="4259692"/>
-            <a:ext cx="184693" cy="608669"/>
+            <a:off x="1162543" y="4173771"/>
+            <a:ext cx="457959" cy="827838"/>
           </a:xfrm>
           <a:prstGeom prst="bentConnector2">
             <a:avLst/>
@@ -6058,7 +6058,7 @@
         </p:nvSpPr>
         <p:spPr>
           <a:xfrm>
-            <a:off x="3107463" y="5084118"/>
+            <a:off x="466379" y="5218647"/>
             <a:ext cx="684964" cy="276999"/>
           </a:xfrm>
           <a:prstGeom prst="rect">
@@ -6113,8 +6113,8 @@
         </p:nvCxnSpPr>
         <p:spPr>
           <a:xfrm flipV="1">
-            <a:off x="3792427" y="4259692"/>
-            <a:ext cx="185260" cy="962926"/>
+            <a:off x="1151343" y="4173771"/>
+            <a:ext cx="469159" cy="1183376"/>
           </a:xfrm>
           <a:prstGeom prst="bentConnector2">
             <a:avLst/>
@@ -6150,14 +6150,14 @@
           <p:cNvCxnSpPr>
             <a:cxnSpLocks/>
             <a:stCxn id="18" idx="0"/>
-            <a:endCxn id="46" idx="2"/>
+            <a:endCxn id="45" idx="2"/>
           </p:cNvCxnSpPr>
           <p:nvPr/>
         </p:nvCxnSpPr>
         <p:spPr>
           <a:xfrm rot="5400000" flipH="1" flipV="1">
-            <a:off x="4609765" y="3058843"/>
-            <a:ext cx="291773" cy="1555929"/>
+            <a:off x="2071449" y="2990261"/>
+            <a:ext cx="455565" cy="1357459"/>
           </a:xfrm>
           <a:prstGeom prst="bentConnector3">
             <a:avLst>
@@ -6197,7 +6197,7 @@
         </p:nvSpPr>
         <p:spPr>
           <a:xfrm>
-            <a:off x="4816755" y="4014874"/>
+            <a:off x="4938053" y="3856254"/>
             <a:ext cx="546398" cy="276999"/>
           </a:xfrm>
           <a:prstGeom prst="rect">
@@ -6252,8 +6252,8 @@
         </p:nvCxnSpPr>
         <p:spPr>
           <a:xfrm flipV="1">
-            <a:off x="5363153" y="3690920"/>
-            <a:ext cx="170463" cy="462454"/>
+            <a:off x="5484451" y="3410123"/>
+            <a:ext cx="170463" cy="584631"/>
           </a:xfrm>
           <a:prstGeom prst="bentConnector2">
             <a:avLst/>
@@ -6291,7 +6291,7 @@
         </p:nvSpPr>
         <p:spPr>
           <a:xfrm>
-            <a:off x="4914791" y="4385297"/>
+            <a:off x="5036089" y="4226677"/>
             <a:ext cx="448361" cy="276999"/>
           </a:xfrm>
           <a:prstGeom prst="rect">
@@ -6346,8 +6346,8 @@
         </p:nvCxnSpPr>
         <p:spPr>
           <a:xfrm flipV="1">
-            <a:off x="5363152" y="3690920"/>
-            <a:ext cx="170464" cy="832877"/>
+            <a:off x="5484450" y="3410123"/>
+            <a:ext cx="170464" cy="955054"/>
           </a:xfrm>
           <a:prstGeom prst="bentConnector2">
             <a:avLst/>
@@ -6385,7 +6385,7 @@
         </p:nvSpPr>
         <p:spPr>
           <a:xfrm>
-            <a:off x="5859810" y="3982692"/>
+            <a:off x="5981108" y="3824072"/>
             <a:ext cx="842269" cy="276999"/>
           </a:xfrm>
           <a:prstGeom prst="rect">
@@ -6444,8 +6444,8 @@
         </p:nvCxnSpPr>
         <p:spPr>
           <a:xfrm rot="16200000" flipV="1">
-            <a:off x="5761395" y="3463141"/>
-            <a:ext cx="291772" cy="747329"/>
+            <a:off x="5821605" y="3243433"/>
+            <a:ext cx="413949" cy="747329"/>
           </a:xfrm>
           <a:prstGeom prst="bentConnector3">
             <a:avLst>
@@ -6488,7 +6488,7 @@
         </p:nvSpPr>
         <p:spPr>
           <a:xfrm>
-            <a:off x="5735252" y="4444127"/>
+            <a:off x="5856550" y="4285507"/>
             <a:ext cx="448361" cy="276999"/>
           </a:xfrm>
           <a:prstGeom prst="rect">
@@ -6547,7 +6547,7 @@
         </p:nvCxnSpPr>
         <p:spPr>
           <a:xfrm flipV="1">
-            <a:off x="6183613" y="4259691"/>
+            <a:off x="6304911" y="4101071"/>
             <a:ext cx="97332" cy="322936"/>
           </a:xfrm>
           <a:prstGeom prst="bentConnector2">
@@ -6589,7 +6589,7 @@
         </p:nvSpPr>
         <p:spPr>
           <a:xfrm>
-            <a:off x="5590832" y="4784864"/>
+            <a:off x="5712130" y="4626244"/>
             <a:ext cx="592782" cy="276999"/>
           </a:xfrm>
           <a:prstGeom prst="rect">
@@ -6648,7 +6648,7 @@
         </p:nvCxnSpPr>
         <p:spPr>
           <a:xfrm flipV="1">
-            <a:off x="6183614" y="4259691"/>
+            <a:off x="6304912" y="4101071"/>
             <a:ext cx="97331" cy="663673"/>
           </a:xfrm>
           <a:prstGeom prst="bentConnector2">
@@ -6690,7 +6690,7 @@
         </p:nvSpPr>
         <p:spPr>
           <a:xfrm>
-            <a:off x="5735252" y="5116947"/>
+            <a:off x="5856550" y="4958327"/>
             <a:ext cx="448362" cy="276999"/>
           </a:xfrm>
           <a:prstGeom prst="rect">
@@ -6749,7 +6749,7 @@
         </p:nvCxnSpPr>
         <p:spPr>
           <a:xfrm flipV="1">
-            <a:off x="6183614" y="4259691"/>
+            <a:off x="6304912" y="4101071"/>
             <a:ext cx="97331" cy="995756"/>
           </a:xfrm>
           <a:prstGeom prst="bentConnector2">
@@ -6791,7 +6791,7 @@
         </p:nvSpPr>
         <p:spPr>
           <a:xfrm>
-            <a:off x="5735250" y="5434477"/>
+            <a:off x="5856548" y="5275857"/>
             <a:ext cx="448362" cy="276999"/>
           </a:xfrm>
           <a:prstGeom prst="rect">
@@ -6850,7 +6850,7 @@
         </p:nvCxnSpPr>
         <p:spPr>
           <a:xfrm flipV="1">
-            <a:off x="6183612" y="4259691"/>
+            <a:off x="6304910" y="4101071"/>
             <a:ext cx="97333" cy="1313286"/>
           </a:xfrm>
           <a:prstGeom prst="bentConnector2">
@@ -6892,7 +6892,7 @@
         </p:nvSpPr>
         <p:spPr>
           <a:xfrm>
-            <a:off x="5735249" y="5773939"/>
+            <a:off x="5856547" y="5615319"/>
             <a:ext cx="448362" cy="276999"/>
           </a:xfrm>
           <a:prstGeom prst="rect">
@@ -6951,7 +6951,7 @@
         </p:nvCxnSpPr>
         <p:spPr>
           <a:xfrm flipV="1">
-            <a:off x="6183611" y="4259691"/>
+            <a:off x="6304909" y="4101071"/>
             <a:ext cx="97334" cy="1652748"/>
           </a:xfrm>
           <a:prstGeom prst="bentConnector2">
@@ -6993,7 +6993,7 @@
         </p:nvSpPr>
         <p:spPr>
           <a:xfrm>
-            <a:off x="5735250" y="6077343"/>
+            <a:off x="5856548" y="5918723"/>
             <a:ext cx="448362" cy="276999"/>
           </a:xfrm>
           <a:prstGeom prst="rect">
@@ -7052,7 +7052,7 @@
         </p:nvCxnSpPr>
         <p:spPr>
           <a:xfrm flipV="1">
-            <a:off x="6183612" y="4259691"/>
+            <a:off x="6304910" y="4101071"/>
             <a:ext cx="97333" cy="1956152"/>
           </a:xfrm>
           <a:prstGeom prst="bentConnector2">
@@ -7094,7 +7094,7 @@
         </p:nvSpPr>
         <p:spPr>
           <a:xfrm>
-            <a:off x="6756721" y="3982692"/>
+            <a:off x="6943336" y="3824072"/>
             <a:ext cx="842269" cy="276999"/>
           </a:xfrm>
           <a:prstGeom prst="rect">
@@ -7155,8 +7155,8 @@
         </p:nvCxnSpPr>
         <p:spPr>
           <a:xfrm rot="16200000" flipV="1">
-            <a:off x="6209850" y="3014686"/>
-            <a:ext cx="291772" cy="1644240"/>
+            <a:off x="6302719" y="2762319"/>
+            <a:ext cx="413949" cy="1709557"/>
           </a:xfrm>
           <a:prstGeom prst="bentConnector3">
             <a:avLst>
@@ -7201,7 +7201,7 @@
         </p:nvSpPr>
         <p:spPr>
           <a:xfrm>
-            <a:off x="6507417" y="4444127"/>
+            <a:off x="6694032" y="4285507"/>
             <a:ext cx="573107" cy="276999"/>
           </a:xfrm>
           <a:prstGeom prst="rect">
@@ -7262,7 +7262,7 @@
         </p:nvCxnSpPr>
         <p:spPr>
           <a:xfrm flipV="1">
-            <a:off x="7080524" y="4259691"/>
+            <a:off x="7267139" y="4101071"/>
             <a:ext cx="97332" cy="322936"/>
           </a:xfrm>
           <a:prstGeom prst="bentConnector2">
@@ -7306,7 +7306,7 @@
         </p:nvSpPr>
         <p:spPr>
           <a:xfrm>
-            <a:off x="6415200" y="4784864"/>
+            <a:off x="6601815" y="4626244"/>
             <a:ext cx="665325" cy="276999"/>
           </a:xfrm>
           <a:prstGeom prst="rect">
@@ -7367,7 +7367,7 @@
         </p:nvCxnSpPr>
         <p:spPr>
           <a:xfrm flipV="1">
-            <a:off x="7080525" y="4259691"/>
+            <a:off x="7267140" y="4101071"/>
             <a:ext cx="97331" cy="663673"/>
           </a:xfrm>
           <a:prstGeom prst="bentConnector2">
@@ -7411,7 +7411,7 @@
         </p:nvSpPr>
         <p:spPr>
           <a:xfrm>
-            <a:off x="6507417" y="5116947"/>
+            <a:off x="6694032" y="4958327"/>
             <a:ext cx="573108" cy="276999"/>
           </a:xfrm>
           <a:prstGeom prst="rect">
@@ -7472,7 +7472,7 @@
         </p:nvCxnSpPr>
         <p:spPr>
           <a:xfrm flipV="1">
-            <a:off x="7080525" y="4259691"/>
+            <a:off x="7267140" y="4101071"/>
             <a:ext cx="97331" cy="995756"/>
           </a:xfrm>
           <a:prstGeom prst="bentConnector2">
@@ -7516,7 +7516,7 @@
         </p:nvSpPr>
         <p:spPr>
           <a:xfrm>
-            <a:off x="4332579" y="4729861"/>
+            <a:off x="4453877" y="4571241"/>
             <a:ext cx="1042177" cy="276999"/>
           </a:xfrm>
           <a:prstGeom prst="rect">
@@ -7570,8 +7570,8 @@
         </p:nvCxnSpPr>
         <p:spPr>
           <a:xfrm flipV="1">
-            <a:off x="5374756" y="3690920"/>
-            <a:ext cx="158860" cy="1177441"/>
+            <a:off x="5496054" y="3410123"/>
+            <a:ext cx="158860" cy="1299618"/>
           </a:xfrm>
           <a:prstGeom prst="bentConnector2">
             <a:avLst/>
@@ -7609,7 +7609,7 @@
         </p:nvSpPr>
         <p:spPr>
           <a:xfrm>
-            <a:off x="4127281" y="5145344"/>
+            <a:off x="4248579" y="4986724"/>
             <a:ext cx="615947" cy="276999"/>
           </a:xfrm>
           <a:prstGeom prst="rect">
@@ -7664,7 +7664,7 @@
         </p:nvCxnSpPr>
         <p:spPr>
           <a:xfrm flipV="1">
-            <a:off x="4743228" y="5006860"/>
+            <a:off x="4864526" y="4848240"/>
             <a:ext cx="110440" cy="276984"/>
           </a:xfrm>
           <a:prstGeom prst="bentConnector2">
@@ -7703,7 +7703,7 @@
         </p:nvSpPr>
         <p:spPr>
           <a:xfrm>
-            <a:off x="4235268" y="5515767"/>
+            <a:off x="4356566" y="5357147"/>
             <a:ext cx="507960" cy="276999"/>
           </a:xfrm>
           <a:prstGeom prst="rect">
@@ -7758,7 +7758,7 @@
         </p:nvCxnSpPr>
         <p:spPr>
           <a:xfrm flipV="1">
-            <a:off x="4743228" y="5006860"/>
+            <a:off x="4864526" y="4848240"/>
             <a:ext cx="110440" cy="647407"/>
           </a:xfrm>
           <a:prstGeom prst="bentConnector2">
@@ -7797,8 +7797,8 @@
         </p:nvSpPr>
         <p:spPr>
           <a:xfrm>
-            <a:off x="6376563" y="5602750"/>
-            <a:ext cx="842269" cy="276999"/>
+            <a:off x="6497861" y="5444130"/>
+            <a:ext cx="967415" cy="276999"/>
           </a:xfrm>
           <a:prstGeom prst="rect">
             <a:avLst/>
@@ -7833,9 +7833,10 @@
           <a:p>
             <a:pPr algn="ctr"/>
             <a:r>
-              <a:rPr lang="en-US" sz="1200" b="1" dirty="0"/>
-              <a:t>Qadder05</a:t>
-            </a:r>
+              <a:rPr lang="en-US" sz="1200" b="1" dirty="0" err="1"/>
+              <a:t>QhalfAdder</a:t>
+            </a:r>
+            <a:endParaRPr lang="en-US" sz="1200" b="1" dirty="0"/>
           </a:p>
         </p:txBody>
       </p:sp>
@@ -7857,8 +7858,8 @@
         </p:nvCxnSpPr>
         <p:spPr>
           <a:xfrm rot="16200000" flipV="1">
-            <a:off x="6691433" y="5496484"/>
-            <a:ext cx="208804" cy="3727"/>
+            <a:off x="6876676" y="5339236"/>
+            <a:ext cx="208804" cy="983"/>
           </a:xfrm>
           <a:prstGeom prst="bentConnector3">
             <a:avLst>
@@ -7903,7 +7904,7 @@
         </p:nvSpPr>
         <p:spPr>
           <a:xfrm>
-            <a:off x="9813430" y="3619374"/>
+            <a:off x="9934728" y="3460754"/>
             <a:ext cx="1112998" cy="276999"/>
           </a:xfrm>
           <a:prstGeom prst="rect">
@@ -7953,10 +7954,10 @@
         </p:nvGrpSpPr>
         <p:grpSpPr>
           <a:xfrm>
-            <a:off x="7786614" y="2668566"/>
-            <a:ext cx="1071329" cy="638923"/>
-            <a:chOff x="8043463" y="3058984"/>
-            <a:chExt cx="1071329" cy="638923"/>
+            <a:off x="8010360" y="2519154"/>
+            <a:ext cx="913268" cy="584430"/>
+            <a:chOff x="8164761" y="2945438"/>
+            <a:chExt cx="913268" cy="584430"/>
           </a:xfrm>
         </p:grpSpPr>
         <p:grpSp>
@@ -7973,10 +7974,10 @@
           </p:nvGrpSpPr>
           <p:grpSpPr>
             <a:xfrm>
-              <a:off x="8043463" y="3058984"/>
-              <a:ext cx="1011990" cy="543696"/>
-              <a:chOff x="7189098" y="-54175"/>
-              <a:chExt cx="1011990" cy="543696"/>
+              <a:off x="8164761" y="2945438"/>
+              <a:ext cx="913268" cy="498622"/>
+              <a:chOff x="7310396" y="-167721"/>
+              <a:chExt cx="913268" cy="498622"/>
             </a:xfrm>
           </p:grpSpPr>
           <p:cxnSp>
@@ -7996,7 +7997,7 @@
             </p:nvCxnSpPr>
             <p:spPr>
               <a:xfrm>
-                <a:off x="7189098" y="-9101"/>
+                <a:off x="7310396" y="-167721"/>
                 <a:ext cx="913268" cy="498622"/>
               </a:xfrm>
               <a:prstGeom prst="bentConnector2">
@@ -8072,7 +8073,7 @@
           </p:nvSpPr>
           <p:spPr>
             <a:xfrm>
-              <a:off x="8947399" y="3451686"/>
+              <a:off x="8873454" y="3283647"/>
               <a:ext cx="167393" cy="246221"/>
             </a:xfrm>
             <a:prstGeom prst="rect">
@@ -8108,7 +8109,7 @@
         </p:nvSpPr>
         <p:spPr>
           <a:xfrm>
-            <a:off x="4697250" y="1688174"/>
+            <a:off x="4818548" y="1529554"/>
             <a:ext cx="167393" cy="246221"/>
           </a:xfrm>
           <a:prstGeom prst="rect">
@@ -8143,7 +8144,7 @@
         </p:nvSpPr>
         <p:spPr>
           <a:xfrm>
-            <a:off x="4208839" y="2169009"/>
+            <a:off x="4330137" y="2010389"/>
             <a:ext cx="167393" cy="246221"/>
           </a:xfrm>
           <a:prstGeom prst="rect">
@@ -8178,7 +8179,7 @@
         </p:nvSpPr>
         <p:spPr>
           <a:xfrm>
-            <a:off x="3060970" y="2452015"/>
+            <a:off x="3182268" y="2293395"/>
             <a:ext cx="167393" cy="246221"/>
           </a:xfrm>
           <a:prstGeom prst="rect">
@@ -8213,10 +8214,10 @@
         </p:nvGrpSpPr>
         <p:grpSpPr>
           <a:xfrm>
-            <a:off x="9164488" y="3307489"/>
-            <a:ext cx="971120" cy="1036888"/>
-            <a:chOff x="8690339" y="1749950"/>
-            <a:chExt cx="971120" cy="1036888"/>
+            <a:off x="9285786" y="3192142"/>
+            <a:ext cx="971120" cy="1108962"/>
+            <a:chOff x="8690339" y="1677876"/>
+            <a:chExt cx="971120" cy="1108962"/>
           </a:xfrm>
         </p:grpSpPr>
         <p:grpSp>
@@ -8233,10 +8234,10 @@
           </p:nvGrpSpPr>
           <p:grpSpPr>
             <a:xfrm>
-              <a:off x="8708591" y="1793223"/>
-              <a:ext cx="952868" cy="993615"/>
-              <a:chOff x="7854226" y="-1319936"/>
-              <a:chExt cx="952868" cy="993615"/>
+              <a:off x="8708591" y="1677876"/>
+              <a:ext cx="952868" cy="1108962"/>
+              <a:chOff x="7854226" y="-1435283"/>
+              <a:chExt cx="952868" cy="1108962"/>
             </a:xfrm>
           </p:grpSpPr>
           <p:cxnSp>
@@ -8257,7 +8258,7 @@
             </p:nvCxnSpPr>
             <p:spPr>
               <a:xfrm rot="10800000">
-                <a:off x="7854226" y="-1319936"/>
+                <a:off x="7854226" y="-1435283"/>
                 <a:ext cx="850343" cy="917666"/>
               </a:xfrm>
               <a:prstGeom prst="bentConnector3">
@@ -8371,7 +8372,7 @@
         </p:nvSpPr>
         <p:spPr>
           <a:xfrm>
-            <a:off x="9956982" y="2896680"/>
+            <a:off x="10078280" y="2738060"/>
             <a:ext cx="823687" cy="276999"/>
           </a:xfrm>
           <a:prstGeom prst="rect">
@@ -8426,7 +8427,7 @@
         </p:nvCxnSpPr>
         <p:spPr>
           <a:xfrm rot="16200000" flipV="1">
-            <a:off x="10146531" y="3395975"/>
+            <a:off x="10267829" y="3237355"/>
             <a:ext cx="445695" cy="1103"/>
           </a:xfrm>
           <a:prstGeom prst="bentConnector3">
@@ -8472,7 +8473,7 @@
         </p:nvSpPr>
         <p:spPr>
           <a:xfrm>
-            <a:off x="7852036" y="3979169"/>
+            <a:off x="7973334" y="3820549"/>
             <a:ext cx="710452" cy="276999"/>
           </a:xfrm>
           <a:prstGeom prst="rect">
@@ -8523,10 +8524,10 @@
         </p:nvGrpSpPr>
         <p:grpSpPr>
           <a:xfrm>
-            <a:off x="8532768" y="3484571"/>
-            <a:ext cx="884787" cy="649607"/>
-            <a:chOff x="7851147" y="1684131"/>
-            <a:chExt cx="884787" cy="649607"/>
+            <a:off x="8598981" y="3325833"/>
+            <a:ext cx="884787" cy="850192"/>
+            <a:chOff x="7851147" y="1530201"/>
+            <a:chExt cx="884787" cy="850192"/>
           </a:xfrm>
         </p:grpSpPr>
         <p:grpSp>
@@ -8543,10 +8544,10 @@
           </p:nvGrpSpPr>
           <p:grpSpPr>
             <a:xfrm>
-              <a:off x="7851147" y="1688821"/>
-              <a:ext cx="884787" cy="644917"/>
-              <a:chOff x="6996782" y="-1424338"/>
-              <a:chExt cx="884787" cy="644917"/>
+              <a:off x="7851147" y="1530201"/>
+              <a:ext cx="884787" cy="850192"/>
+              <a:chOff x="6996782" y="-1582958"/>
+              <a:chExt cx="884787" cy="850192"/>
             </a:xfrm>
           </p:grpSpPr>
           <p:cxnSp>
@@ -8567,7 +8568,7 @@
             </p:nvCxnSpPr>
             <p:spPr>
               <a:xfrm flipV="1">
-                <a:off x="7026502" y="-1424338"/>
+                <a:off x="7147800" y="-1582958"/>
                 <a:ext cx="137394" cy="628408"/>
               </a:xfrm>
               <a:prstGeom prst="bentConnector2">
@@ -8606,7 +8607,7 @@
             </p:nvSpPr>
             <p:spPr>
               <a:xfrm>
-                <a:off x="6996782" y="-1033337"/>
+                <a:off x="6996782" y="-986682"/>
                 <a:ext cx="884787" cy="253916"/>
               </a:xfrm>
               <a:prstGeom prst="rect">
@@ -8679,7 +8680,7 @@
         </p:nvSpPr>
         <p:spPr>
           <a:xfrm>
-            <a:off x="7497615" y="4384339"/>
+            <a:off x="7618913" y="4225719"/>
             <a:ext cx="497701" cy="276999"/>
           </a:xfrm>
           <a:prstGeom prst="rect">
@@ -8741,10 +8742,10 @@
         </p:nvGrpSpPr>
         <p:grpSpPr>
           <a:xfrm>
-            <a:off x="7945382" y="4256167"/>
-            <a:ext cx="990028" cy="352313"/>
-            <a:chOff x="7106438" y="894831"/>
-            <a:chExt cx="990028" cy="352313"/>
+            <a:off x="8066680" y="4097547"/>
+            <a:ext cx="990028" cy="510933"/>
+            <a:chOff x="7106438" y="736211"/>
+            <a:chExt cx="990028" cy="510933"/>
           </a:xfrm>
         </p:grpSpPr>
         <p:grpSp>
@@ -8761,10 +8762,10 @@
           </p:nvGrpSpPr>
           <p:grpSpPr>
             <a:xfrm>
-              <a:off x="7156373" y="894831"/>
-              <a:ext cx="940093" cy="266671"/>
-              <a:chOff x="6302008" y="-2218328"/>
-              <a:chExt cx="940093" cy="266671"/>
+              <a:off x="7211679" y="736211"/>
+              <a:ext cx="884787" cy="412536"/>
+              <a:chOff x="6357314" y="-2376948"/>
+              <a:chExt cx="884787" cy="412536"/>
             </a:xfrm>
           </p:grpSpPr>
           <p:cxnSp>
@@ -8785,7 +8786,7 @@
             </p:nvCxnSpPr>
             <p:spPr>
               <a:xfrm rot="5400000">
-                <a:off x="6274645" y="-2190965"/>
+                <a:off x="6395943" y="-2349585"/>
                 <a:ext cx="266671" cy="211946"/>
               </a:xfrm>
               <a:prstGeom prst="bentConnector2">
@@ -8897,7 +8898,7 @@
         </p:nvSpPr>
         <p:spPr>
           <a:xfrm>
-            <a:off x="10033082" y="4129928"/>
+            <a:off x="10154380" y="3971308"/>
             <a:ext cx="675377" cy="276999"/>
           </a:xfrm>
           <a:prstGeom prst="rect">
@@ -8930,14 +8931,14 @@
             <a:r>
               <a:rPr lang="en-US" sz="1200" b="1" dirty="0" err="1">
                 <a:solidFill>
-                  <a:srgbClr val="C00000"/>
+                  <a:schemeClr val="tx1"/>
                 </a:solidFill>
               </a:rPr>
               <a:t>Qsolver</a:t>
             </a:r>
             <a:endParaRPr lang="en-US" sz="1200" b="1" dirty="0">
               <a:solidFill>
-                <a:srgbClr val="C00000"/>
+                <a:schemeClr val="tx1"/>
               </a:solidFill>
             </a:endParaRPr>
           </a:p>
@@ -8961,7 +8962,7 @@
         </p:nvCxnSpPr>
         <p:spPr>
           <a:xfrm rot="16200000" flipH="1">
-            <a:off x="10253573" y="4012729"/>
+            <a:off x="10374871" y="3854109"/>
             <a:ext cx="233555" cy="842"/>
           </a:xfrm>
           <a:prstGeom prst="bentConnector3">
@@ -9007,20 +9008,13 @@
         </p:nvSpPr>
         <p:spPr>
           <a:xfrm>
-            <a:off x="10318171" y="4820719"/>
-            <a:ext cx="1170577" cy="276999"/>
+            <a:off x="10518177" y="4662099"/>
+            <a:ext cx="1013162" cy="276999"/>
           </a:xfrm>
           <a:prstGeom prst="rect">
             <a:avLst/>
           </a:prstGeom>
-          <a:solidFill>
-            <a:srgbClr val="FFFF00"/>
-          </a:solidFill>
-          <a:ln w="19050">
-            <a:solidFill>
-              <a:srgbClr val="FF0000"/>
-            </a:solidFill>
-          </a:ln>
+          <a:ln w="19050"/>
         </p:spPr>
         <p:style>
           <a:lnRef idx="2">
@@ -9044,18 +9038,10 @@
           <a:p>
             <a:pPr algn="ctr"/>
             <a:r>
-              <a:rPr lang="en-US" sz="1200" b="1" dirty="0" err="1">
-                <a:solidFill>
-                  <a:srgbClr val="C00000"/>
-                </a:solidFill>
-              </a:rPr>
-              <a:t>DWQuboSolver</a:t>
-            </a:r>
-            <a:endParaRPr lang="en-US" sz="1200" b="1" dirty="0">
-              <a:solidFill>
-                <a:srgbClr val="C00000"/>
-              </a:solidFill>
-            </a:endParaRPr>
+              <a:rPr lang="en-US" sz="1200" b="1" dirty="0" err="1"/>
+              <a:t>DwaveSolver</a:t>
+            </a:r>
+            <a:endParaRPr lang="en-US" sz="1200" b="1" dirty="0"/>
           </a:p>
         </p:txBody>
       </p:sp>
@@ -9073,20 +9059,13 @@
         </p:nvSpPr>
         <p:spPr>
           <a:xfrm>
-            <a:off x="9253064" y="4820719"/>
-            <a:ext cx="938270" cy="276999"/>
+            <a:off x="9320661" y="4662099"/>
+            <a:ext cx="1045672" cy="276999"/>
           </a:xfrm>
           <a:prstGeom prst="rect">
             <a:avLst/>
           </a:prstGeom>
-          <a:solidFill>
-            <a:srgbClr val="FFFF00"/>
-          </a:solidFill>
-          <a:ln w="19050">
-            <a:solidFill>
-              <a:srgbClr val="FF0000"/>
-            </a:solidFill>
-          </a:ln>
+          <a:ln w="19050"/>
         </p:spPr>
         <p:style>
           <a:lnRef idx="2">
@@ -9110,18 +9089,10 @@
           <a:p>
             <a:pPr algn="ctr"/>
             <a:r>
-              <a:rPr lang="en-US" sz="1200" b="1" dirty="0" err="1">
-                <a:solidFill>
-                  <a:srgbClr val="C00000"/>
-                </a:solidFill>
-              </a:rPr>
-              <a:t>IBMQsolver</a:t>
-            </a:r>
-            <a:endParaRPr lang="en-US" sz="1200" b="1" dirty="0">
-              <a:solidFill>
-                <a:srgbClr val="C00000"/>
-              </a:solidFill>
-            </a:endParaRPr>
+              <a:rPr lang="en-US" sz="1200" b="1" dirty="0" err="1"/>
+              <a:t>QiskitQsolver</a:t>
+            </a:r>
+            <a:endParaRPr lang="en-US" sz="1200" b="1" dirty="0"/>
           </a:p>
         </p:txBody>
       </p:sp>
@@ -9143,294 +9114,8 @@
         </p:nvCxnSpPr>
         <p:spPr>
           <a:xfrm rot="16200000" flipV="1">
-            <a:off x="10430220" y="4347478"/>
+            <a:off x="10551518" y="4188858"/>
             <a:ext cx="413792" cy="532689"/>
-          </a:xfrm>
-          <a:prstGeom prst="bentConnector3">
-            <a:avLst>
-              <a:gd name="adj1" fmla="val 50000"/>
-            </a:avLst>
-          </a:prstGeom>
-          <a:ln w="19050">
-            <a:solidFill>
-              <a:srgbClr val="FF0000"/>
-            </a:solidFill>
-            <a:tailEnd type="triangle"/>
-          </a:ln>
-        </p:spPr>
-        <p:style>
-          <a:lnRef idx="1">
-            <a:schemeClr val="accent6"/>
-          </a:lnRef>
-          <a:fillRef idx="0">
-            <a:schemeClr val="accent6"/>
-          </a:fillRef>
-          <a:effectRef idx="0">
-            <a:schemeClr val="accent6"/>
-          </a:effectRef>
-          <a:fontRef idx="minor">
-            <a:schemeClr val="tx1"/>
-          </a:fontRef>
-        </p:style>
-      </p:cxnSp>
-      <p:cxnSp>
-        <p:nvCxnSpPr>
-          <p:cNvPr id="207" name="Connector: Elbow 74">
-            <a:extLst>
-              <a:ext uri="{FF2B5EF4-FFF2-40B4-BE49-F238E27FC236}">
-                <a16:creationId xmlns:a16="http://schemas.microsoft.com/office/drawing/2014/main" id="{2D357FDF-1275-54BE-1CEB-CC1CAB609C5D}"/>
-              </a:ext>
-            </a:extLst>
-          </p:cNvPr>
-          <p:cNvCxnSpPr>
-            <a:cxnSpLocks/>
-            <a:stCxn id="203" idx="0"/>
-            <a:endCxn id="198" idx="2"/>
-          </p:cNvCxnSpPr>
-          <p:nvPr/>
-        </p:nvCxnSpPr>
-        <p:spPr>
-          <a:xfrm rot="5400000" flipH="1" flipV="1">
-            <a:off x="9839589" y="4289537"/>
-            <a:ext cx="413792" cy="648572"/>
-          </a:xfrm>
-          <a:prstGeom prst="bentConnector3">
-            <a:avLst>
-              <a:gd name="adj1" fmla="val 50000"/>
-            </a:avLst>
-          </a:prstGeom>
-          <a:ln w="19050">
-            <a:solidFill>
-              <a:srgbClr val="FF0000"/>
-            </a:solidFill>
-            <a:tailEnd type="triangle"/>
-          </a:ln>
-        </p:spPr>
-        <p:style>
-          <a:lnRef idx="1">
-            <a:schemeClr val="accent6"/>
-          </a:lnRef>
-          <a:fillRef idx="0">
-            <a:schemeClr val="accent6"/>
-          </a:fillRef>
-          <a:effectRef idx="0">
-            <a:schemeClr val="accent6"/>
-          </a:effectRef>
-          <a:fontRef idx="minor">
-            <a:schemeClr val="tx1"/>
-          </a:fontRef>
-        </p:style>
-      </p:cxnSp>
-      <p:sp>
-        <p:nvSpPr>
-          <p:cNvPr id="211" name="Rectangle 210">
-            <a:extLst>
-              <a:ext uri="{FF2B5EF4-FFF2-40B4-BE49-F238E27FC236}">
-                <a16:creationId xmlns:a16="http://schemas.microsoft.com/office/drawing/2014/main" id="{701EE951-176B-CCBE-5F4A-BFC6125E6367}"/>
-              </a:ext>
-            </a:extLst>
-          </p:cNvPr>
-          <p:cNvSpPr/>
-          <p:nvPr/>
-        </p:nvSpPr>
-        <p:spPr>
-          <a:xfrm>
-            <a:off x="11297647" y="2895386"/>
-            <a:ext cx="540534" cy="276999"/>
-          </a:xfrm>
-          <a:prstGeom prst="rect">
-            <a:avLst/>
-          </a:prstGeom>
-          <a:ln w="19050"/>
-        </p:spPr>
-        <p:style>
-          <a:lnRef idx="2">
-            <a:schemeClr val="accent3"/>
-          </a:lnRef>
-          <a:fillRef idx="1">
-            <a:schemeClr val="lt1"/>
-          </a:fillRef>
-          <a:effectRef idx="0">
-            <a:schemeClr val="accent3"/>
-          </a:effectRef>
-          <a:fontRef idx="minor">
-            <a:schemeClr val="dk1"/>
-          </a:fontRef>
-        </p:style>
-        <p:txBody>
-          <a:bodyPr wrap="none" rtlCol="0" anchor="ctr">
-            <a:spAutoFit/>
-          </a:bodyPr>
-          <a:lstStyle/>
-          <a:p>
-            <a:pPr algn="ctr"/>
-            <a:r>
-              <a:rPr lang="en-US" sz="1200" b="1" dirty="0" err="1"/>
-              <a:t>Qubo</a:t>
-            </a:r>
-            <a:endParaRPr lang="en-US" sz="1200" b="1" dirty="0"/>
-          </a:p>
-        </p:txBody>
-      </p:sp>
-      <p:cxnSp>
-        <p:nvCxnSpPr>
-          <p:cNvPr id="212" name="Connector: Elbow 99">
-            <a:extLst>
-              <a:ext uri="{FF2B5EF4-FFF2-40B4-BE49-F238E27FC236}">
-                <a16:creationId xmlns:a16="http://schemas.microsoft.com/office/drawing/2014/main" id="{A8C93C71-3C10-1B80-E883-D9D5830FB712}"/>
-              </a:ext>
-            </a:extLst>
-          </p:cNvPr>
-          <p:cNvCxnSpPr>
-            <a:cxnSpLocks/>
-            <a:stCxn id="176" idx="3"/>
-            <a:endCxn id="211" idx="1"/>
-          </p:cNvCxnSpPr>
-          <p:nvPr/>
-        </p:nvCxnSpPr>
-        <p:spPr>
-          <a:xfrm flipV="1">
-            <a:off x="10780669" y="3033886"/>
-            <a:ext cx="516978" cy="1294"/>
-          </a:xfrm>
-          <a:prstGeom prst="bentConnector3">
-            <a:avLst>
-              <a:gd name="adj1" fmla="val 50000"/>
-            </a:avLst>
-          </a:prstGeom>
-          <a:ln>
-            <a:headEnd type="diamond" w="lg" len="lg"/>
-          </a:ln>
-        </p:spPr>
-        <p:style>
-          <a:lnRef idx="1">
-            <a:schemeClr val="accent3"/>
-          </a:lnRef>
-          <a:fillRef idx="0">
-            <a:schemeClr val="accent3"/>
-          </a:fillRef>
-          <a:effectRef idx="0">
-            <a:schemeClr val="accent3"/>
-          </a:effectRef>
-          <a:fontRef idx="minor">
-            <a:schemeClr val="tx1"/>
-          </a:fontRef>
-        </p:style>
-      </p:cxnSp>
-      <p:cxnSp>
-        <p:nvCxnSpPr>
-          <p:cNvPr id="218" name="Connector: Elbow 99">
-            <a:extLst>
-              <a:ext uri="{FF2B5EF4-FFF2-40B4-BE49-F238E27FC236}">
-                <a16:creationId xmlns:a16="http://schemas.microsoft.com/office/drawing/2014/main" id="{BE9CE43F-274B-2C61-ADEE-20D6B523E060}"/>
-              </a:ext>
-            </a:extLst>
-          </p:cNvPr>
-          <p:cNvCxnSpPr>
-            <a:cxnSpLocks/>
-            <a:stCxn id="202" idx="3"/>
-            <a:endCxn id="211" idx="2"/>
-          </p:cNvCxnSpPr>
-          <p:nvPr/>
-        </p:nvCxnSpPr>
-        <p:spPr>
-          <a:xfrm flipV="1">
-            <a:off x="11488748" y="3172385"/>
-            <a:ext cx="79166" cy="1786834"/>
-          </a:xfrm>
-          <a:prstGeom prst="bentConnector2">
-            <a:avLst/>
-          </a:prstGeom>
-          <a:ln>
-            <a:headEnd type="diamond" w="lg" len="lg"/>
-          </a:ln>
-        </p:spPr>
-        <p:style>
-          <a:lnRef idx="1">
-            <a:schemeClr val="accent3"/>
-          </a:lnRef>
-          <a:fillRef idx="0">
-            <a:schemeClr val="accent3"/>
-          </a:fillRef>
-          <a:effectRef idx="0">
-            <a:schemeClr val="accent3"/>
-          </a:effectRef>
-          <a:fontRef idx="minor">
-            <a:schemeClr val="tx1"/>
-          </a:fontRef>
-        </p:style>
-      </p:cxnSp>
-      <p:sp>
-        <p:nvSpPr>
-          <p:cNvPr id="222" name="Rectangle 221">
-            <a:extLst>
-              <a:ext uri="{FF2B5EF4-FFF2-40B4-BE49-F238E27FC236}">
-                <a16:creationId xmlns:a16="http://schemas.microsoft.com/office/drawing/2014/main" id="{096F2E3C-171E-3B83-91D8-D20D53EA838E}"/>
-              </a:ext>
-            </a:extLst>
-          </p:cNvPr>
-          <p:cNvSpPr/>
-          <p:nvPr/>
-        </p:nvSpPr>
-        <p:spPr>
-          <a:xfrm>
-            <a:off x="7053428" y="762746"/>
-            <a:ext cx="888373" cy="276999"/>
-          </a:xfrm>
-          <a:prstGeom prst="rect">
-            <a:avLst/>
-          </a:prstGeom>
-          <a:ln w="19050"/>
-        </p:spPr>
-        <p:style>
-          <a:lnRef idx="2">
-            <a:schemeClr val="accent3"/>
-          </a:lnRef>
-          <a:fillRef idx="1">
-            <a:schemeClr val="lt1"/>
-          </a:fillRef>
-          <a:effectRef idx="0">
-            <a:schemeClr val="accent3"/>
-          </a:effectRef>
-          <a:fontRef idx="minor">
-            <a:schemeClr val="dk1"/>
-          </a:fontRef>
-        </p:style>
-        <p:txBody>
-          <a:bodyPr wrap="square" rtlCol="0" anchor="ctr">
-            <a:spAutoFit/>
-          </a:bodyPr>
-          <a:lstStyle/>
-          <a:p>
-            <a:pPr algn="ctr"/>
-            <a:r>
-              <a:rPr lang="en-US" sz="1200" b="1" dirty="0" err="1"/>
-              <a:t>Qstatment</a:t>
-            </a:r>
-            <a:endParaRPr lang="en-US" sz="1200" b="1" dirty="0"/>
-          </a:p>
-        </p:txBody>
-      </p:sp>
-      <p:cxnSp>
-        <p:nvCxnSpPr>
-          <p:cNvPr id="223" name="Connector: Elbow 87">
-            <a:extLst>
-              <a:ext uri="{FF2B5EF4-FFF2-40B4-BE49-F238E27FC236}">
-                <a16:creationId xmlns:a16="http://schemas.microsoft.com/office/drawing/2014/main" id="{14DBB7B7-D0BE-EE5E-A7FB-E1501F90BC73}"/>
-              </a:ext>
-            </a:extLst>
-          </p:cNvPr>
-          <p:cNvCxnSpPr>
-            <a:cxnSpLocks/>
-            <a:stCxn id="87" idx="0"/>
-            <a:endCxn id="222" idx="2"/>
-          </p:cNvCxnSpPr>
-          <p:nvPr/>
-        </p:nvCxnSpPr>
-        <p:spPr>
-          <a:xfrm rot="5400000" flipH="1" flipV="1">
-            <a:off x="6758883" y="1692529"/>
-            <a:ext cx="1391516" cy="85948"/>
           </a:xfrm>
           <a:prstGeom prst="bentConnector3">
             <a:avLst>
@@ -9463,24 +9148,24 @@
       </p:cxnSp>
       <p:cxnSp>
         <p:nvCxnSpPr>
-          <p:cNvPr id="226" name="Connector: Elbow 87">
-            <a:extLst>
-              <a:ext uri="{FF2B5EF4-FFF2-40B4-BE49-F238E27FC236}">
-                <a16:creationId xmlns:a16="http://schemas.microsoft.com/office/drawing/2014/main" id="{39B46B81-17D8-7AEA-D30A-BEAF51CD0F78}"/>
+          <p:cNvPr id="207" name="Connector: Elbow 74">
+            <a:extLst>
+              <a:ext uri="{FF2B5EF4-FFF2-40B4-BE49-F238E27FC236}">
+                <a16:creationId xmlns:a16="http://schemas.microsoft.com/office/drawing/2014/main" id="{2D357FDF-1275-54BE-1CEB-CC1CAB609C5D}"/>
               </a:ext>
             </a:extLst>
           </p:cNvPr>
           <p:cNvCxnSpPr>
             <a:cxnSpLocks/>
-            <a:stCxn id="74" idx="0"/>
-            <a:endCxn id="222" idx="2"/>
+            <a:stCxn id="203" idx="0"/>
+            <a:endCxn id="198" idx="2"/>
           </p:cNvCxnSpPr>
           <p:nvPr/>
         </p:nvCxnSpPr>
         <p:spPr>
-          <a:xfrm rot="16200000" flipV="1">
-            <a:off x="8199249" y="338112"/>
-            <a:ext cx="465645" cy="1868911"/>
+          <a:xfrm rot="5400000" flipH="1" flipV="1">
+            <a:off x="9960887" y="4130917"/>
+            <a:ext cx="413792" cy="648572"/>
           </a:xfrm>
           <a:prstGeom prst="bentConnector3">
             <a:avLst>
@@ -9513,10 +9198,10 @@
       </p:cxnSp>
       <p:sp>
         <p:nvSpPr>
-          <p:cNvPr id="229" name="Rectangle 228">
-            <a:extLst>
-              <a:ext uri="{FF2B5EF4-FFF2-40B4-BE49-F238E27FC236}">
-                <a16:creationId xmlns:a16="http://schemas.microsoft.com/office/drawing/2014/main" id="{8B8B2E14-EE4A-296D-5A87-65821A9D5C74}"/>
+          <p:cNvPr id="211" name="Rectangle 210">
+            <a:extLst>
+              <a:ext uri="{FF2B5EF4-FFF2-40B4-BE49-F238E27FC236}">
+                <a16:creationId xmlns:a16="http://schemas.microsoft.com/office/drawing/2014/main" id="{701EE951-176B-CCBE-5F4A-BFC6125E6367}"/>
               </a:ext>
             </a:extLst>
           </p:cNvPr>
@@ -9525,17 +9210,152 @@
         </p:nvSpPr>
         <p:spPr>
           <a:xfrm>
-            <a:off x="4675474" y="982902"/>
-            <a:ext cx="797804" cy="276999"/>
+            <a:off x="11418945" y="2736766"/>
+            <a:ext cx="540534" cy="276999"/>
           </a:xfrm>
           <a:prstGeom prst="rect">
             <a:avLst/>
           </a:prstGeom>
-          <a:ln w="19050">
-            <a:solidFill>
-              <a:srgbClr val="7030A0"/>
-            </a:solidFill>
+          <a:ln w="19050"/>
+        </p:spPr>
+        <p:style>
+          <a:lnRef idx="2">
+            <a:schemeClr val="accent3"/>
+          </a:lnRef>
+          <a:fillRef idx="1">
+            <a:schemeClr val="lt1"/>
+          </a:fillRef>
+          <a:effectRef idx="0">
+            <a:schemeClr val="accent3"/>
+          </a:effectRef>
+          <a:fontRef idx="minor">
+            <a:schemeClr val="dk1"/>
+          </a:fontRef>
+        </p:style>
+        <p:txBody>
+          <a:bodyPr wrap="none" rtlCol="0" anchor="ctr">
+            <a:spAutoFit/>
+          </a:bodyPr>
+          <a:lstStyle/>
+          <a:p>
+            <a:pPr algn="ctr"/>
+            <a:r>
+              <a:rPr lang="en-US" sz="1200" b="1" dirty="0" err="1"/>
+              <a:t>Qubo</a:t>
+            </a:r>
+            <a:endParaRPr lang="en-US" sz="1200" b="1" dirty="0"/>
+          </a:p>
+        </p:txBody>
+      </p:sp>
+      <p:cxnSp>
+        <p:nvCxnSpPr>
+          <p:cNvPr id="212" name="Connector: Elbow 99">
+            <a:extLst>
+              <a:ext uri="{FF2B5EF4-FFF2-40B4-BE49-F238E27FC236}">
+                <a16:creationId xmlns:a16="http://schemas.microsoft.com/office/drawing/2014/main" id="{A8C93C71-3C10-1B80-E883-D9D5830FB712}"/>
+              </a:ext>
+            </a:extLst>
+          </p:cNvPr>
+          <p:cNvCxnSpPr>
+            <a:cxnSpLocks/>
+            <a:stCxn id="176" idx="3"/>
+            <a:endCxn id="211" idx="1"/>
+          </p:cNvCxnSpPr>
+          <p:nvPr/>
+        </p:nvCxnSpPr>
+        <p:spPr>
+          <a:xfrm flipV="1">
+            <a:off x="10901967" y="2875266"/>
+            <a:ext cx="516978" cy="1294"/>
+          </a:xfrm>
+          <a:prstGeom prst="bentConnector3">
+            <a:avLst>
+              <a:gd name="adj1" fmla="val 50000"/>
+            </a:avLst>
+          </a:prstGeom>
+          <a:ln>
+            <a:headEnd type="diamond" w="lg" len="lg"/>
           </a:ln>
+        </p:spPr>
+        <p:style>
+          <a:lnRef idx="1">
+            <a:schemeClr val="accent3"/>
+          </a:lnRef>
+          <a:fillRef idx="0">
+            <a:schemeClr val="accent3"/>
+          </a:fillRef>
+          <a:effectRef idx="0">
+            <a:schemeClr val="accent3"/>
+          </a:effectRef>
+          <a:fontRef idx="minor">
+            <a:schemeClr val="tx1"/>
+          </a:fontRef>
+        </p:style>
+      </p:cxnSp>
+      <p:cxnSp>
+        <p:nvCxnSpPr>
+          <p:cNvPr id="218" name="Connector: Elbow 99">
+            <a:extLst>
+              <a:ext uri="{FF2B5EF4-FFF2-40B4-BE49-F238E27FC236}">
+                <a16:creationId xmlns:a16="http://schemas.microsoft.com/office/drawing/2014/main" id="{BE9CE43F-274B-2C61-ADEE-20D6B523E060}"/>
+              </a:ext>
+            </a:extLst>
+          </p:cNvPr>
+          <p:cNvCxnSpPr>
+            <a:cxnSpLocks/>
+            <a:stCxn id="202" idx="3"/>
+            <a:endCxn id="211" idx="2"/>
+          </p:cNvCxnSpPr>
+          <p:nvPr/>
+        </p:nvCxnSpPr>
+        <p:spPr>
+          <a:xfrm flipV="1">
+            <a:off x="11531339" y="3013765"/>
+            <a:ext cx="157873" cy="1786834"/>
+          </a:xfrm>
+          <a:prstGeom prst="bentConnector2">
+            <a:avLst/>
+          </a:prstGeom>
+          <a:ln>
+            <a:headEnd type="diamond" w="lg" len="lg"/>
+          </a:ln>
+        </p:spPr>
+        <p:style>
+          <a:lnRef idx="1">
+            <a:schemeClr val="accent3"/>
+          </a:lnRef>
+          <a:fillRef idx="0">
+            <a:schemeClr val="accent3"/>
+          </a:fillRef>
+          <a:effectRef idx="0">
+            <a:schemeClr val="accent3"/>
+          </a:effectRef>
+          <a:fontRef idx="minor">
+            <a:schemeClr val="tx1"/>
+          </a:fontRef>
+        </p:style>
+      </p:cxnSp>
+      <p:sp>
+        <p:nvSpPr>
+          <p:cNvPr id="222" name="Rectangle 221">
+            <a:extLst>
+              <a:ext uri="{FF2B5EF4-FFF2-40B4-BE49-F238E27FC236}">
+                <a16:creationId xmlns:a16="http://schemas.microsoft.com/office/drawing/2014/main" id="{096F2E3C-171E-3B83-91D8-D20D53EA838E}"/>
+              </a:ext>
+            </a:extLst>
+          </p:cNvPr>
+          <p:cNvSpPr/>
+          <p:nvPr/>
+        </p:nvSpPr>
+        <p:spPr>
+          <a:xfrm>
+            <a:off x="7174726" y="576133"/>
+            <a:ext cx="888373" cy="276999"/>
+          </a:xfrm>
+          <a:prstGeom prst="rect">
+            <a:avLst/>
+          </a:prstGeom>
+          <a:ln w="19050"/>
         </p:spPr>
         <p:style>
           <a:lnRef idx="2">
@@ -9560,58 +9380,7 @@
             <a:pPr algn="ctr"/>
             <a:r>
               <a:rPr lang="en-US" sz="1200" b="1" dirty="0" err="1"/>
-              <a:t>Qroutine</a:t>
-            </a:r>
-            <a:endParaRPr lang="en-US" sz="1200" b="1" dirty="0"/>
-          </a:p>
-        </p:txBody>
-      </p:sp>
-      <p:sp>
-        <p:nvSpPr>
-          <p:cNvPr id="230" name="Rectangle 229">
-            <a:extLst>
-              <a:ext uri="{FF2B5EF4-FFF2-40B4-BE49-F238E27FC236}">
-                <a16:creationId xmlns:a16="http://schemas.microsoft.com/office/drawing/2014/main" id="{AAF1B4EA-6CEB-9F03-9485-0D5517D5B2CC}"/>
-              </a:ext>
-            </a:extLst>
-          </p:cNvPr>
-          <p:cNvSpPr/>
-          <p:nvPr/>
-        </p:nvSpPr>
-        <p:spPr>
-          <a:xfrm>
-            <a:off x="6135665" y="1265715"/>
-            <a:ext cx="646279" cy="276999"/>
-          </a:xfrm>
-          <a:prstGeom prst="rect">
-            <a:avLst/>
-          </a:prstGeom>
-          <a:ln w="19050"/>
-        </p:spPr>
-        <p:style>
-          <a:lnRef idx="2">
-            <a:schemeClr val="accent3"/>
-          </a:lnRef>
-          <a:fillRef idx="1">
-            <a:schemeClr val="lt1"/>
-          </a:fillRef>
-          <a:effectRef idx="0">
-            <a:schemeClr val="accent3"/>
-          </a:effectRef>
-          <a:fontRef idx="minor">
-            <a:schemeClr val="dk1"/>
-          </a:fontRef>
-        </p:style>
-        <p:txBody>
-          <a:bodyPr wrap="square" rtlCol="0" anchor="ctr">
-            <a:spAutoFit/>
-          </a:bodyPr>
-          <a:lstStyle/>
-          <a:p>
-            <a:pPr algn="ctr"/>
-            <a:r>
-              <a:rPr lang="en-US" sz="1200" b="1" dirty="0" err="1"/>
-              <a:t>Qblock</a:t>
+              <a:t>Qstatment</a:t>
             </a:r>
             <a:endParaRPr lang="en-US" sz="1200" b="1" dirty="0"/>
           </a:p>
@@ -9619,27 +9388,29 @@
       </p:sp>
       <p:cxnSp>
         <p:nvCxnSpPr>
-          <p:cNvPr id="231" name="Connector: Elbow 87">
-            <a:extLst>
-              <a:ext uri="{FF2B5EF4-FFF2-40B4-BE49-F238E27FC236}">
-                <a16:creationId xmlns:a16="http://schemas.microsoft.com/office/drawing/2014/main" id="{2FB11DD4-DE62-3128-F700-F262ED63A8E4}"/>
+          <p:cNvPr id="223" name="Connector: Elbow 87">
+            <a:extLst>
+              <a:ext uri="{FF2B5EF4-FFF2-40B4-BE49-F238E27FC236}">
+                <a16:creationId xmlns:a16="http://schemas.microsoft.com/office/drawing/2014/main" id="{14DBB7B7-D0BE-EE5E-A7FB-E1501F90BC73}"/>
               </a:ext>
             </a:extLst>
           </p:cNvPr>
           <p:cNvCxnSpPr>
             <a:cxnSpLocks/>
-            <a:stCxn id="230" idx="3"/>
+            <a:stCxn id="87" idx="0"/>
             <a:endCxn id="222" idx="2"/>
           </p:cNvCxnSpPr>
           <p:nvPr/>
         </p:nvCxnSpPr>
         <p:spPr>
-          <a:xfrm flipV="1">
-            <a:off x="6781944" y="1039745"/>
-            <a:ext cx="715671" cy="364470"/>
-          </a:xfrm>
-          <a:prstGeom prst="bentConnector2">
-            <a:avLst/>
+          <a:xfrm rot="5400000" flipH="1" flipV="1">
+            <a:off x="6866185" y="1519913"/>
+            <a:ext cx="1419509" cy="85948"/>
+          </a:xfrm>
+          <a:prstGeom prst="bentConnector3">
+            <a:avLst>
+              <a:gd name="adj1" fmla="val 50000"/>
+            </a:avLst>
           </a:prstGeom>
           <a:ln w="19050">
             <a:solidFill>
@@ -9667,456 +9438,24 @@
       </p:cxnSp>
       <p:cxnSp>
         <p:nvCxnSpPr>
-          <p:cNvPr id="234" name="Connector: Elbow 99">
-            <a:extLst>
-              <a:ext uri="{FF2B5EF4-FFF2-40B4-BE49-F238E27FC236}">
-                <a16:creationId xmlns:a16="http://schemas.microsoft.com/office/drawing/2014/main" id="{BC020598-6E65-91E5-C47B-D09B8FCEBD72}"/>
+          <p:cNvPr id="226" name="Connector: Elbow 87">
+            <a:extLst>
+              <a:ext uri="{FF2B5EF4-FFF2-40B4-BE49-F238E27FC236}">
+                <a16:creationId xmlns:a16="http://schemas.microsoft.com/office/drawing/2014/main" id="{39B46B81-17D8-7AEA-D30A-BEAF51CD0F78}"/>
               </a:ext>
             </a:extLst>
           </p:cNvPr>
           <p:cNvCxnSpPr>
             <a:cxnSpLocks/>
-            <a:stCxn id="230" idx="0"/>
-            <a:endCxn id="222" idx="1"/>
+            <a:stCxn id="74" idx="0"/>
+            <a:endCxn id="222" idx="2"/>
           </p:cNvCxnSpPr>
           <p:nvPr/>
         </p:nvCxnSpPr>
         <p:spPr>
-          <a:xfrm rot="5400000" flipH="1" flipV="1">
-            <a:off x="6573882" y="786170"/>
-            <a:ext cx="364469" cy="594623"/>
-          </a:xfrm>
-          <a:prstGeom prst="bentConnector2">
-            <a:avLst/>
-          </a:prstGeom>
-          <a:ln>
-            <a:headEnd type="diamond" w="lg" len="lg"/>
-          </a:ln>
-        </p:spPr>
-        <p:style>
-          <a:lnRef idx="1">
-            <a:schemeClr val="accent3"/>
-          </a:lnRef>
-          <a:fillRef idx="0">
-            <a:schemeClr val="accent3"/>
-          </a:fillRef>
-          <a:effectRef idx="0">
-            <a:schemeClr val="accent3"/>
-          </a:effectRef>
-          <a:fontRef idx="minor">
-            <a:schemeClr val="tx1"/>
-          </a:fontRef>
-        </p:style>
-      </p:cxnSp>
-      <p:sp>
-        <p:nvSpPr>
-          <p:cNvPr id="242" name="TextBox 241">
-            <a:extLst>
-              <a:ext uri="{FF2B5EF4-FFF2-40B4-BE49-F238E27FC236}">
-                <a16:creationId xmlns:a16="http://schemas.microsoft.com/office/drawing/2014/main" id="{3C7BAB20-4C4D-7F30-325C-7864086B2A05}"/>
-              </a:ext>
-            </a:extLst>
-          </p:cNvPr>
-          <p:cNvSpPr txBox="1"/>
-          <p:nvPr/>
-        </p:nvSpPr>
-        <p:spPr>
-          <a:xfrm>
-            <a:off x="6886035" y="830894"/>
-            <a:ext cx="167393" cy="246221"/>
-          </a:xfrm>
-          <a:prstGeom prst="rect">
-            <a:avLst/>
-          </a:prstGeom>
-          <a:noFill/>
-        </p:spPr>
-        <p:txBody>
-          <a:bodyPr wrap="square" rtlCol="0">
-            <a:spAutoFit/>
-          </a:bodyPr>
-          <a:lstStyle/>
-          <a:p>
-            <a:r>
-              <a:rPr lang="en-US" sz="1000" dirty="0"/>
-              <a:t>*</a:t>
-            </a:r>
-          </a:p>
-        </p:txBody>
-      </p:sp>
-      <p:cxnSp>
-        <p:nvCxnSpPr>
-          <p:cNvPr id="243" name="Connector: Elbow 87">
-            <a:extLst>
-              <a:ext uri="{FF2B5EF4-FFF2-40B4-BE49-F238E27FC236}">
-                <a16:creationId xmlns:a16="http://schemas.microsoft.com/office/drawing/2014/main" id="{4D8D47A7-2862-81E0-4757-BA82A7D32128}"/>
-              </a:ext>
-            </a:extLst>
-          </p:cNvPr>
-          <p:cNvCxnSpPr>
-            <a:cxnSpLocks/>
-            <a:stCxn id="229" idx="2"/>
-            <a:endCxn id="9" idx="0"/>
-          </p:cNvCxnSpPr>
-          <p:nvPr/>
-        </p:nvCxnSpPr>
-        <p:spPr>
-          <a:xfrm rot="5400000">
-            <a:off x="4087326" y="518339"/>
-            <a:ext cx="245489" cy="1728613"/>
-          </a:xfrm>
-          <a:prstGeom prst="bentConnector3">
-            <a:avLst>
-              <a:gd name="adj1" fmla="val 50000"/>
-            </a:avLst>
-          </a:prstGeom>
-          <a:ln w="19050">
-            <a:solidFill>
-              <a:srgbClr val="7030A0"/>
-            </a:solidFill>
-            <a:tailEnd type="triangle"/>
-          </a:ln>
-        </p:spPr>
-        <p:style>
-          <a:lnRef idx="1">
-            <a:schemeClr val="accent6"/>
-          </a:lnRef>
-          <a:fillRef idx="0">
-            <a:schemeClr val="accent6"/>
-          </a:fillRef>
-          <a:effectRef idx="0">
-            <a:schemeClr val="accent6"/>
-          </a:effectRef>
-          <a:fontRef idx="minor">
-            <a:schemeClr val="tx1"/>
-          </a:fontRef>
-        </p:style>
-      </p:cxnSp>
-      <p:cxnSp>
-        <p:nvCxnSpPr>
-          <p:cNvPr id="246" name="Connector: Elbow 87">
-            <a:extLst>
-              <a:ext uri="{FF2B5EF4-FFF2-40B4-BE49-F238E27FC236}">
-                <a16:creationId xmlns:a16="http://schemas.microsoft.com/office/drawing/2014/main" id="{29ED93B8-4FFF-EDCB-EEF7-D94C7B95DE75}"/>
-              </a:ext>
-            </a:extLst>
-          </p:cNvPr>
-          <p:cNvCxnSpPr>
-            <a:cxnSpLocks/>
-            <a:stCxn id="229" idx="2"/>
-            <a:endCxn id="31" idx="0"/>
-          </p:cNvCxnSpPr>
-          <p:nvPr/>
-        </p:nvCxnSpPr>
-        <p:spPr>
-          <a:xfrm rot="16200000" flipH="1">
-            <a:off x="4653232" y="1681045"/>
-            <a:ext cx="1184419" cy="342130"/>
-          </a:xfrm>
-          <a:prstGeom prst="bentConnector3">
-            <a:avLst>
-              <a:gd name="adj1" fmla="val 50000"/>
-            </a:avLst>
-          </a:prstGeom>
-          <a:ln w="19050">
-            <a:solidFill>
-              <a:srgbClr val="7030A0"/>
-            </a:solidFill>
-            <a:tailEnd type="triangle"/>
-          </a:ln>
-        </p:spPr>
-        <p:style>
-          <a:lnRef idx="1">
-            <a:schemeClr val="accent6"/>
-          </a:lnRef>
-          <a:fillRef idx="0">
-            <a:schemeClr val="accent6"/>
-          </a:fillRef>
-          <a:effectRef idx="0">
-            <a:schemeClr val="accent6"/>
-          </a:effectRef>
-          <a:fontRef idx="minor">
-            <a:schemeClr val="tx1"/>
-          </a:fontRef>
-        </p:style>
-      </p:cxnSp>
-      <p:cxnSp>
-        <p:nvCxnSpPr>
-          <p:cNvPr id="249" name="Connector: Elbow 99">
-            <a:extLst>
-              <a:ext uri="{FF2B5EF4-FFF2-40B4-BE49-F238E27FC236}">
-                <a16:creationId xmlns:a16="http://schemas.microsoft.com/office/drawing/2014/main" id="{1A39EA0A-7603-30D1-1FF1-AD06E81F8202}"/>
-              </a:ext>
-            </a:extLst>
-          </p:cNvPr>
-          <p:cNvCxnSpPr>
-            <a:cxnSpLocks/>
-            <a:stCxn id="229" idx="3"/>
-            <a:endCxn id="230" idx="1"/>
-          </p:cNvCxnSpPr>
-          <p:nvPr/>
-        </p:nvCxnSpPr>
-        <p:spPr>
-          <a:xfrm>
-            <a:off x="5473278" y="1121402"/>
-            <a:ext cx="662387" cy="282813"/>
-          </a:xfrm>
-          <a:prstGeom prst="bentConnector3">
-            <a:avLst>
-              <a:gd name="adj1" fmla="val 50000"/>
-            </a:avLst>
-          </a:prstGeom>
-          <a:ln>
-            <a:headEnd type="diamond" w="lg" len="lg"/>
-          </a:ln>
-        </p:spPr>
-        <p:style>
-          <a:lnRef idx="1">
-            <a:schemeClr val="accent3"/>
-          </a:lnRef>
-          <a:fillRef idx="0">
-            <a:schemeClr val="accent3"/>
-          </a:fillRef>
-          <a:effectRef idx="0">
-            <a:schemeClr val="accent3"/>
-          </a:effectRef>
-          <a:fontRef idx="minor">
-            <a:schemeClr val="tx1"/>
-          </a:fontRef>
-        </p:style>
-      </p:cxnSp>
-      <p:sp>
-        <p:nvSpPr>
-          <p:cNvPr id="252" name="TextBox 251">
-            <a:extLst>
-              <a:ext uri="{FF2B5EF4-FFF2-40B4-BE49-F238E27FC236}">
-                <a16:creationId xmlns:a16="http://schemas.microsoft.com/office/drawing/2014/main" id="{897A96F1-843E-E9F8-BA59-43DCC1AB9435}"/>
-              </a:ext>
-            </a:extLst>
-          </p:cNvPr>
-          <p:cNvSpPr txBox="1"/>
-          <p:nvPr/>
-        </p:nvSpPr>
-        <p:spPr>
-          <a:xfrm>
-            <a:off x="5420043" y="887138"/>
-            <a:ext cx="680523" cy="253916"/>
-          </a:xfrm>
-          <a:prstGeom prst="rect">
-            <a:avLst/>
-          </a:prstGeom>
-          <a:noFill/>
-        </p:spPr>
-        <p:txBody>
-          <a:bodyPr wrap="square" rtlCol="0">
-            <a:spAutoFit/>
-          </a:bodyPr>
-          <a:lstStyle/>
-          <a:p>
-            <a:r>
-              <a:rPr lang="en-US" sz="1050" b="1" dirty="0" err="1"/>
-              <a:t>mBlock</a:t>
-            </a:r>
-            <a:endParaRPr lang="en-US" sz="1050" b="1" dirty="0"/>
-          </a:p>
-        </p:txBody>
-      </p:sp>
-      <p:sp>
-        <p:nvSpPr>
-          <p:cNvPr id="253" name="Rectangle 252">
-            <a:extLst>
-              <a:ext uri="{FF2B5EF4-FFF2-40B4-BE49-F238E27FC236}">
-                <a16:creationId xmlns:a16="http://schemas.microsoft.com/office/drawing/2014/main" id="{C6E9FE68-78F4-CA4B-5028-C51D8FE3653A}"/>
-              </a:ext>
-            </a:extLst>
-          </p:cNvPr>
-          <p:cNvSpPr/>
-          <p:nvPr/>
-        </p:nvSpPr>
-        <p:spPr>
-          <a:xfrm>
-            <a:off x="9681275" y="5280788"/>
-            <a:ext cx="853953" cy="276999"/>
-          </a:xfrm>
-          <a:prstGeom prst="rect">
-            <a:avLst/>
-          </a:prstGeom>
-          <a:ln w="19050"/>
-        </p:spPr>
-        <p:style>
-          <a:lnRef idx="2">
-            <a:schemeClr val="accent3"/>
-          </a:lnRef>
-          <a:fillRef idx="1">
-            <a:schemeClr val="lt1"/>
-          </a:fillRef>
-          <a:effectRef idx="0">
-            <a:schemeClr val="accent3"/>
-          </a:effectRef>
-          <a:fontRef idx="minor">
-            <a:schemeClr val="dk1"/>
-          </a:fontRef>
-        </p:style>
-        <p:txBody>
-          <a:bodyPr wrap="none" rtlCol="0" anchor="ctr">
-            <a:spAutoFit/>
-          </a:bodyPr>
-          <a:lstStyle/>
-          <a:p>
-            <a:pPr algn="ctr"/>
-            <a:r>
-              <a:rPr lang="en-US" sz="1200" b="1" dirty="0" err="1">
-                <a:solidFill>
-                  <a:srgbClr val="C00000"/>
-                </a:solidFill>
-              </a:rPr>
-              <a:t>Qcompiler</a:t>
-            </a:r>
-            <a:endParaRPr lang="en-US" sz="1200" b="1" dirty="0">
-              <a:solidFill>
-                <a:srgbClr val="C00000"/>
-              </a:solidFill>
-            </a:endParaRPr>
-          </a:p>
-        </p:txBody>
-      </p:sp>
-      <p:sp>
-        <p:nvSpPr>
-          <p:cNvPr id="254" name="Rectangle 253">
-            <a:extLst>
-              <a:ext uri="{FF2B5EF4-FFF2-40B4-BE49-F238E27FC236}">
-                <a16:creationId xmlns:a16="http://schemas.microsoft.com/office/drawing/2014/main" id="{4C5D4A16-17F7-84A7-932F-C27BD9559BA4}"/>
-              </a:ext>
-            </a:extLst>
-          </p:cNvPr>
-          <p:cNvSpPr/>
-          <p:nvPr/>
-        </p:nvSpPr>
-        <p:spPr>
-          <a:xfrm>
-            <a:off x="10222637" y="5867291"/>
-            <a:ext cx="1122423" cy="276999"/>
-          </a:xfrm>
-          <a:prstGeom prst="rect">
-            <a:avLst/>
-          </a:prstGeom>
-          <a:ln w="19050"/>
-        </p:spPr>
-        <p:style>
-          <a:lnRef idx="2">
-            <a:schemeClr val="accent3"/>
-          </a:lnRef>
-          <a:fillRef idx="1">
-            <a:schemeClr val="lt1"/>
-          </a:fillRef>
-          <a:effectRef idx="0">
-            <a:schemeClr val="accent3"/>
-          </a:effectRef>
-          <a:fontRef idx="minor">
-            <a:schemeClr val="dk1"/>
-          </a:fontRef>
-        </p:style>
-        <p:txBody>
-          <a:bodyPr wrap="none" rtlCol="0" anchor="ctr">
-            <a:spAutoFit/>
-          </a:bodyPr>
-          <a:lstStyle/>
-          <a:p>
-            <a:pPr algn="ctr"/>
-            <a:r>
-              <a:rPr lang="en-US" sz="1200" b="1" dirty="0" err="1">
-                <a:solidFill>
-                  <a:srgbClr val="C00000"/>
-                </a:solidFill>
-              </a:rPr>
-              <a:t>QuboCompiler</a:t>
-            </a:r>
-            <a:endParaRPr lang="en-US" sz="1200" b="1" dirty="0">
-              <a:solidFill>
-                <a:srgbClr val="C00000"/>
-              </a:solidFill>
-            </a:endParaRPr>
-          </a:p>
-        </p:txBody>
-      </p:sp>
-      <p:sp>
-        <p:nvSpPr>
-          <p:cNvPr id="255" name="Rectangle 254">
-            <a:extLst>
-              <a:ext uri="{FF2B5EF4-FFF2-40B4-BE49-F238E27FC236}">
-                <a16:creationId xmlns:a16="http://schemas.microsoft.com/office/drawing/2014/main" id="{759F386C-A41D-E514-26F1-5E869B9C632A}"/>
-              </a:ext>
-            </a:extLst>
-          </p:cNvPr>
-          <p:cNvSpPr/>
-          <p:nvPr/>
-        </p:nvSpPr>
-        <p:spPr>
-          <a:xfrm>
-            <a:off x="8941617" y="5867292"/>
-            <a:ext cx="1136850" cy="276999"/>
-          </a:xfrm>
-          <a:prstGeom prst="rect">
-            <a:avLst/>
-          </a:prstGeom>
-          <a:ln w="19050"/>
-        </p:spPr>
-        <p:style>
-          <a:lnRef idx="2">
-            <a:schemeClr val="accent3"/>
-          </a:lnRef>
-          <a:fillRef idx="1">
-            <a:schemeClr val="lt1"/>
-          </a:fillRef>
-          <a:effectRef idx="0">
-            <a:schemeClr val="accent3"/>
-          </a:effectRef>
-          <a:fontRef idx="minor">
-            <a:schemeClr val="dk1"/>
-          </a:fontRef>
-        </p:style>
-        <p:txBody>
-          <a:bodyPr wrap="none" rtlCol="0" anchor="ctr">
-            <a:spAutoFit/>
-          </a:bodyPr>
-          <a:lstStyle/>
-          <a:p>
-            <a:pPr algn="ctr"/>
-            <a:r>
-              <a:rPr lang="en-US" sz="1200" b="1" dirty="0" err="1">
-                <a:solidFill>
-                  <a:srgbClr val="C00000"/>
-                </a:solidFill>
-              </a:rPr>
-              <a:t>QiskitCompiler</a:t>
-            </a:r>
-            <a:endParaRPr lang="en-US" sz="1200" b="1" dirty="0">
-              <a:solidFill>
-                <a:srgbClr val="C00000"/>
-              </a:solidFill>
-            </a:endParaRPr>
-          </a:p>
-        </p:txBody>
-      </p:sp>
-      <p:cxnSp>
-        <p:nvCxnSpPr>
-          <p:cNvPr id="256" name="Connector: Elbow 74">
-            <a:extLst>
-              <a:ext uri="{FF2B5EF4-FFF2-40B4-BE49-F238E27FC236}">
-                <a16:creationId xmlns:a16="http://schemas.microsoft.com/office/drawing/2014/main" id="{3096A562-4E4D-6570-4EB2-0DC23215A7F2}"/>
-              </a:ext>
-            </a:extLst>
-          </p:cNvPr>
-          <p:cNvCxnSpPr>
-            <a:cxnSpLocks/>
-            <a:stCxn id="254" idx="0"/>
-            <a:endCxn id="253" idx="2"/>
-          </p:cNvCxnSpPr>
-          <p:nvPr/>
-        </p:nvCxnSpPr>
-        <p:spPr>
           <a:xfrm rot="16200000" flipV="1">
-            <a:off x="10291299" y="5374740"/>
-            <a:ext cx="309504" cy="675597"/>
+            <a:off x="8306550" y="165495"/>
+            <a:ext cx="493638" cy="1868911"/>
           </a:xfrm>
           <a:prstGeom prst="bentConnector3">
             <a:avLst>
@@ -10147,31 +9486,135 @@
           </a:fontRef>
         </p:style>
       </p:cxnSp>
+      <p:sp>
+        <p:nvSpPr>
+          <p:cNvPr id="229" name="Rectangle 228">
+            <a:extLst>
+              <a:ext uri="{FF2B5EF4-FFF2-40B4-BE49-F238E27FC236}">
+                <a16:creationId xmlns:a16="http://schemas.microsoft.com/office/drawing/2014/main" id="{8B8B2E14-EE4A-296D-5A87-65821A9D5C74}"/>
+              </a:ext>
+            </a:extLst>
+          </p:cNvPr>
+          <p:cNvSpPr/>
+          <p:nvPr/>
+        </p:nvSpPr>
+        <p:spPr>
+          <a:xfrm>
+            <a:off x="3208739" y="4028799"/>
+            <a:ext cx="941608" cy="276999"/>
+          </a:xfrm>
+          <a:prstGeom prst="rect">
+            <a:avLst/>
+          </a:prstGeom>
+          <a:ln w="19050">
+            <a:solidFill>
+              <a:srgbClr val="7030A0"/>
+            </a:solidFill>
+          </a:ln>
+        </p:spPr>
+        <p:style>
+          <a:lnRef idx="2">
+            <a:schemeClr val="accent3"/>
+          </a:lnRef>
+          <a:fillRef idx="1">
+            <a:schemeClr val="lt1"/>
+          </a:fillRef>
+          <a:effectRef idx="0">
+            <a:schemeClr val="accent3"/>
+          </a:effectRef>
+          <a:fontRef idx="minor">
+            <a:schemeClr val="dk1"/>
+          </a:fontRef>
+        </p:style>
+        <p:txBody>
+          <a:bodyPr wrap="square" rtlCol="0" anchor="ctr">
+            <a:spAutoFit/>
+          </a:bodyPr>
+          <a:lstStyle/>
+          <a:p>
+            <a:pPr algn="ctr"/>
+            <a:r>
+              <a:rPr lang="en-US" sz="1200" b="1" dirty="0" err="1"/>
+              <a:t>Qfunction</a:t>
+            </a:r>
+            <a:endParaRPr lang="en-US" sz="1200" b="1" dirty="0"/>
+          </a:p>
+        </p:txBody>
+      </p:sp>
+      <p:sp>
+        <p:nvSpPr>
+          <p:cNvPr id="230" name="Rectangle 229">
+            <a:extLst>
+              <a:ext uri="{FF2B5EF4-FFF2-40B4-BE49-F238E27FC236}">
+                <a16:creationId xmlns:a16="http://schemas.microsoft.com/office/drawing/2014/main" id="{AAF1B4EA-6CEB-9F03-9485-0D5517D5B2CC}"/>
+              </a:ext>
+            </a:extLst>
+          </p:cNvPr>
+          <p:cNvSpPr/>
+          <p:nvPr/>
+        </p:nvSpPr>
+        <p:spPr>
+          <a:xfrm>
+            <a:off x="6256963" y="1013785"/>
+            <a:ext cx="646279" cy="276999"/>
+          </a:xfrm>
+          <a:prstGeom prst="rect">
+            <a:avLst/>
+          </a:prstGeom>
+          <a:ln w="19050"/>
+        </p:spPr>
+        <p:style>
+          <a:lnRef idx="2">
+            <a:schemeClr val="accent3"/>
+          </a:lnRef>
+          <a:fillRef idx="1">
+            <a:schemeClr val="lt1"/>
+          </a:fillRef>
+          <a:effectRef idx="0">
+            <a:schemeClr val="accent3"/>
+          </a:effectRef>
+          <a:fontRef idx="minor">
+            <a:schemeClr val="dk1"/>
+          </a:fontRef>
+        </p:style>
+        <p:txBody>
+          <a:bodyPr wrap="square" rtlCol="0" anchor="ctr">
+            <a:spAutoFit/>
+          </a:bodyPr>
+          <a:lstStyle/>
+          <a:p>
+            <a:pPr algn="ctr"/>
+            <a:r>
+              <a:rPr lang="en-US" sz="1200" b="1" dirty="0" err="1"/>
+              <a:t>Qblock</a:t>
+            </a:r>
+            <a:endParaRPr lang="en-US" sz="1200" b="1" dirty="0"/>
+          </a:p>
+        </p:txBody>
+      </p:sp>
       <p:cxnSp>
         <p:nvCxnSpPr>
-          <p:cNvPr id="259" name="Connector: Elbow 74">
-            <a:extLst>
-              <a:ext uri="{FF2B5EF4-FFF2-40B4-BE49-F238E27FC236}">
-                <a16:creationId xmlns:a16="http://schemas.microsoft.com/office/drawing/2014/main" id="{06FDF315-A10D-C7C7-7B95-FA90B7C5134B}"/>
+          <p:cNvPr id="231" name="Connector: Elbow 87">
+            <a:extLst>
+              <a:ext uri="{FF2B5EF4-FFF2-40B4-BE49-F238E27FC236}">
+                <a16:creationId xmlns:a16="http://schemas.microsoft.com/office/drawing/2014/main" id="{2FB11DD4-DE62-3128-F700-F262ED63A8E4}"/>
               </a:ext>
             </a:extLst>
           </p:cNvPr>
           <p:cNvCxnSpPr>
             <a:cxnSpLocks/>
-            <a:stCxn id="255" idx="0"/>
-            <a:endCxn id="253" idx="2"/>
+            <a:stCxn id="230" idx="3"/>
+            <a:endCxn id="222" idx="2"/>
           </p:cNvCxnSpPr>
           <p:nvPr/>
         </p:nvCxnSpPr>
         <p:spPr>
-          <a:xfrm rot="5400000" flipH="1" flipV="1">
-            <a:off x="9654395" y="5413435"/>
-            <a:ext cx="309505" cy="598210"/>
-          </a:xfrm>
-          <a:prstGeom prst="bentConnector3">
-            <a:avLst>
-              <a:gd name="adj1" fmla="val 50000"/>
-            </a:avLst>
+          <a:xfrm flipV="1">
+            <a:off x="6903242" y="853132"/>
+            <a:ext cx="715671" cy="299153"/>
+          </a:xfrm>
+          <a:prstGeom prst="bentConnector2">
+            <a:avLst/>
           </a:prstGeom>
           <a:ln w="19050">
             <a:solidFill>
@@ -10197,6 +9640,486 @@
           </a:fontRef>
         </p:style>
       </p:cxnSp>
+      <p:cxnSp>
+        <p:nvCxnSpPr>
+          <p:cNvPr id="234" name="Connector: Elbow 99">
+            <a:extLst>
+              <a:ext uri="{FF2B5EF4-FFF2-40B4-BE49-F238E27FC236}">
+                <a16:creationId xmlns:a16="http://schemas.microsoft.com/office/drawing/2014/main" id="{BC020598-6E65-91E5-C47B-D09B8FCEBD72}"/>
+              </a:ext>
+            </a:extLst>
+          </p:cNvPr>
+          <p:cNvCxnSpPr>
+            <a:cxnSpLocks/>
+            <a:stCxn id="230" idx="0"/>
+            <a:endCxn id="222" idx="1"/>
+          </p:cNvCxnSpPr>
+          <p:nvPr/>
+        </p:nvCxnSpPr>
+        <p:spPr>
+          <a:xfrm rot="5400000" flipH="1" flipV="1">
+            <a:off x="6727838" y="566898"/>
+            <a:ext cx="299152" cy="594623"/>
+          </a:xfrm>
+          <a:prstGeom prst="bentConnector2">
+            <a:avLst/>
+          </a:prstGeom>
+          <a:ln>
+            <a:headEnd type="diamond" w="lg" len="lg"/>
+          </a:ln>
+        </p:spPr>
+        <p:style>
+          <a:lnRef idx="1">
+            <a:schemeClr val="accent3"/>
+          </a:lnRef>
+          <a:fillRef idx="0">
+            <a:schemeClr val="accent3"/>
+          </a:fillRef>
+          <a:effectRef idx="0">
+            <a:schemeClr val="accent3"/>
+          </a:effectRef>
+          <a:fontRef idx="minor">
+            <a:schemeClr val="tx1"/>
+          </a:fontRef>
+        </p:style>
+      </p:cxnSp>
+      <p:sp>
+        <p:nvSpPr>
+          <p:cNvPr id="242" name="TextBox 241">
+            <a:extLst>
+              <a:ext uri="{FF2B5EF4-FFF2-40B4-BE49-F238E27FC236}">
+                <a16:creationId xmlns:a16="http://schemas.microsoft.com/office/drawing/2014/main" id="{3C7BAB20-4C4D-7F30-325C-7864086B2A05}"/>
+              </a:ext>
+            </a:extLst>
+          </p:cNvPr>
+          <p:cNvSpPr txBox="1"/>
+          <p:nvPr/>
+        </p:nvSpPr>
+        <p:spPr>
+          <a:xfrm>
+            <a:off x="7007333" y="672274"/>
+            <a:ext cx="167393" cy="246221"/>
+          </a:xfrm>
+          <a:prstGeom prst="rect">
+            <a:avLst/>
+          </a:prstGeom>
+          <a:noFill/>
+        </p:spPr>
+        <p:txBody>
+          <a:bodyPr wrap="square" rtlCol="0">
+            <a:spAutoFit/>
+          </a:bodyPr>
+          <a:lstStyle/>
+          <a:p>
+            <a:r>
+              <a:rPr lang="en-US" sz="1000" dirty="0"/>
+              <a:t>*</a:t>
+            </a:r>
+          </a:p>
+        </p:txBody>
+      </p:sp>
+      <p:cxnSp>
+        <p:nvCxnSpPr>
+          <p:cNvPr id="246" name="Connector: Elbow 87">
+            <a:extLst>
+              <a:ext uri="{FF2B5EF4-FFF2-40B4-BE49-F238E27FC236}">
+                <a16:creationId xmlns:a16="http://schemas.microsoft.com/office/drawing/2014/main" id="{29ED93B8-4FFF-EDCB-EEF7-D94C7B95DE75}"/>
+              </a:ext>
+            </a:extLst>
+          </p:cNvPr>
+          <p:cNvCxnSpPr>
+            <a:cxnSpLocks/>
+            <a:stCxn id="229" idx="1"/>
+            <a:endCxn id="45" idx="2"/>
+          </p:cNvCxnSpPr>
+          <p:nvPr/>
+        </p:nvCxnSpPr>
+        <p:spPr>
+          <a:xfrm rot="10800000">
+            <a:off x="2977961" y="3441207"/>
+            <a:ext cx="230778" cy="726092"/>
+          </a:xfrm>
+          <a:prstGeom prst="bentConnector2">
+            <a:avLst/>
+          </a:prstGeom>
+          <a:ln w="19050">
+            <a:solidFill>
+              <a:srgbClr val="7030A0"/>
+            </a:solidFill>
+            <a:tailEnd type="triangle"/>
+          </a:ln>
+        </p:spPr>
+        <p:style>
+          <a:lnRef idx="1">
+            <a:schemeClr val="accent6"/>
+          </a:lnRef>
+          <a:fillRef idx="0">
+            <a:schemeClr val="accent6"/>
+          </a:fillRef>
+          <a:effectRef idx="0">
+            <a:schemeClr val="accent6"/>
+          </a:effectRef>
+          <a:fontRef idx="minor">
+            <a:schemeClr val="tx1"/>
+          </a:fontRef>
+        </p:style>
+      </p:cxnSp>
+      <p:cxnSp>
+        <p:nvCxnSpPr>
+          <p:cNvPr id="249" name="Connector: Elbow 99">
+            <a:extLst>
+              <a:ext uri="{FF2B5EF4-FFF2-40B4-BE49-F238E27FC236}">
+                <a16:creationId xmlns:a16="http://schemas.microsoft.com/office/drawing/2014/main" id="{1A39EA0A-7603-30D1-1FF1-AD06E81F8202}"/>
+              </a:ext>
+            </a:extLst>
+          </p:cNvPr>
+          <p:cNvCxnSpPr>
+            <a:cxnSpLocks/>
+            <a:stCxn id="36" idx="2"/>
+            <a:endCxn id="230" idx="1"/>
+          </p:cNvCxnSpPr>
+          <p:nvPr/>
+        </p:nvCxnSpPr>
+        <p:spPr>
+          <a:xfrm rot="16200000" flipH="1">
+            <a:off x="5687306" y="582627"/>
+            <a:ext cx="689367" cy="449947"/>
+          </a:xfrm>
+          <a:prstGeom prst="bentConnector2">
+            <a:avLst/>
+          </a:prstGeom>
+          <a:ln>
+            <a:headEnd type="diamond" w="lg" len="lg"/>
+          </a:ln>
+        </p:spPr>
+        <p:style>
+          <a:lnRef idx="1">
+            <a:schemeClr val="accent3"/>
+          </a:lnRef>
+          <a:fillRef idx="0">
+            <a:schemeClr val="accent3"/>
+          </a:fillRef>
+          <a:effectRef idx="0">
+            <a:schemeClr val="accent3"/>
+          </a:effectRef>
+          <a:fontRef idx="minor">
+            <a:schemeClr val="tx1"/>
+          </a:fontRef>
+        </p:style>
+      </p:cxnSp>
+      <p:sp>
+        <p:nvSpPr>
+          <p:cNvPr id="252" name="TextBox 251">
+            <a:extLst>
+              <a:ext uri="{FF2B5EF4-FFF2-40B4-BE49-F238E27FC236}">
+                <a16:creationId xmlns:a16="http://schemas.microsoft.com/office/drawing/2014/main" id="{897A96F1-843E-E9F8-BA59-43DCC1AB9435}"/>
+              </a:ext>
+            </a:extLst>
+          </p:cNvPr>
+          <p:cNvSpPr txBox="1"/>
+          <p:nvPr/>
+        </p:nvSpPr>
+        <p:spPr>
+          <a:xfrm>
+            <a:off x="5567596" y="736174"/>
+            <a:ext cx="680523" cy="253916"/>
+          </a:xfrm>
+          <a:prstGeom prst="rect">
+            <a:avLst/>
+          </a:prstGeom>
+          <a:noFill/>
+        </p:spPr>
+        <p:txBody>
+          <a:bodyPr wrap="square" rtlCol="0">
+            <a:spAutoFit/>
+          </a:bodyPr>
+          <a:lstStyle/>
+          <a:p>
+            <a:r>
+              <a:rPr lang="en-US" sz="1050" b="1" dirty="0" err="1"/>
+              <a:t>mBlock</a:t>
+            </a:r>
+            <a:endParaRPr lang="en-US" sz="1050" b="1" dirty="0"/>
+          </a:p>
+        </p:txBody>
+      </p:sp>
+      <p:sp>
+        <p:nvSpPr>
+          <p:cNvPr id="253" name="Rectangle 252">
+            <a:extLst>
+              <a:ext uri="{FF2B5EF4-FFF2-40B4-BE49-F238E27FC236}">
+                <a16:creationId xmlns:a16="http://schemas.microsoft.com/office/drawing/2014/main" id="{C6E9FE68-78F4-CA4B-5028-C51D8FE3653A}"/>
+              </a:ext>
+            </a:extLst>
+          </p:cNvPr>
+          <p:cNvSpPr/>
+          <p:nvPr/>
+        </p:nvSpPr>
+        <p:spPr>
+          <a:xfrm>
+            <a:off x="9802573" y="5122168"/>
+            <a:ext cx="853953" cy="276999"/>
+          </a:xfrm>
+          <a:prstGeom prst="rect">
+            <a:avLst/>
+          </a:prstGeom>
+          <a:ln w="19050"/>
+        </p:spPr>
+        <p:style>
+          <a:lnRef idx="2">
+            <a:schemeClr val="accent3"/>
+          </a:lnRef>
+          <a:fillRef idx="1">
+            <a:schemeClr val="lt1"/>
+          </a:fillRef>
+          <a:effectRef idx="0">
+            <a:schemeClr val="accent3"/>
+          </a:effectRef>
+          <a:fontRef idx="minor">
+            <a:schemeClr val="dk1"/>
+          </a:fontRef>
+        </p:style>
+        <p:txBody>
+          <a:bodyPr wrap="none" rtlCol="0" anchor="ctr">
+            <a:spAutoFit/>
+          </a:bodyPr>
+          <a:lstStyle/>
+          <a:p>
+            <a:pPr algn="ctr"/>
+            <a:r>
+              <a:rPr lang="en-US" sz="1200" b="1" dirty="0" err="1">
+                <a:solidFill>
+                  <a:schemeClr val="tx1"/>
+                </a:solidFill>
+              </a:rPr>
+              <a:t>Qcompiler</a:t>
+            </a:r>
+            <a:endParaRPr lang="en-US" sz="1200" b="1" dirty="0">
+              <a:solidFill>
+                <a:schemeClr val="tx1"/>
+              </a:solidFill>
+            </a:endParaRPr>
+          </a:p>
+        </p:txBody>
+      </p:sp>
+      <p:sp>
+        <p:nvSpPr>
+          <p:cNvPr id="254" name="Rectangle 253">
+            <a:extLst>
+              <a:ext uri="{FF2B5EF4-FFF2-40B4-BE49-F238E27FC236}">
+                <a16:creationId xmlns:a16="http://schemas.microsoft.com/office/drawing/2014/main" id="{4C5D4A16-17F7-84A7-932F-C27BD9559BA4}"/>
+              </a:ext>
+            </a:extLst>
+          </p:cNvPr>
+          <p:cNvSpPr/>
+          <p:nvPr/>
+        </p:nvSpPr>
+        <p:spPr>
+          <a:xfrm>
+            <a:off x="10343935" y="5708671"/>
+            <a:ext cx="1122423" cy="276999"/>
+          </a:xfrm>
+          <a:prstGeom prst="rect">
+            <a:avLst/>
+          </a:prstGeom>
+          <a:ln w="19050"/>
+        </p:spPr>
+        <p:style>
+          <a:lnRef idx="2">
+            <a:schemeClr val="accent3"/>
+          </a:lnRef>
+          <a:fillRef idx="1">
+            <a:schemeClr val="lt1"/>
+          </a:fillRef>
+          <a:effectRef idx="0">
+            <a:schemeClr val="accent3"/>
+          </a:effectRef>
+          <a:fontRef idx="minor">
+            <a:schemeClr val="dk1"/>
+          </a:fontRef>
+        </p:style>
+        <p:txBody>
+          <a:bodyPr wrap="none" rtlCol="0" anchor="ctr">
+            <a:spAutoFit/>
+          </a:bodyPr>
+          <a:lstStyle/>
+          <a:p>
+            <a:pPr algn="ctr"/>
+            <a:r>
+              <a:rPr lang="en-US" sz="1200" b="1" dirty="0" err="1">
+                <a:solidFill>
+                  <a:schemeClr val="tx1"/>
+                </a:solidFill>
+              </a:rPr>
+              <a:t>QuboCompiler</a:t>
+            </a:r>
+            <a:endParaRPr lang="en-US" sz="1200" b="1" dirty="0">
+              <a:solidFill>
+                <a:schemeClr val="tx1"/>
+              </a:solidFill>
+            </a:endParaRPr>
+          </a:p>
+        </p:txBody>
+      </p:sp>
+      <p:sp>
+        <p:nvSpPr>
+          <p:cNvPr id="255" name="Rectangle 254">
+            <a:extLst>
+              <a:ext uri="{FF2B5EF4-FFF2-40B4-BE49-F238E27FC236}">
+                <a16:creationId xmlns:a16="http://schemas.microsoft.com/office/drawing/2014/main" id="{759F386C-A41D-E514-26F1-5E869B9C632A}"/>
+              </a:ext>
+            </a:extLst>
+          </p:cNvPr>
+          <p:cNvSpPr/>
+          <p:nvPr/>
+        </p:nvSpPr>
+        <p:spPr>
+          <a:xfrm>
+            <a:off x="9062915" y="5708672"/>
+            <a:ext cx="1136850" cy="276999"/>
+          </a:xfrm>
+          <a:prstGeom prst="rect">
+            <a:avLst/>
+          </a:prstGeom>
+          <a:ln w="19050"/>
+        </p:spPr>
+        <p:style>
+          <a:lnRef idx="2">
+            <a:schemeClr val="accent3"/>
+          </a:lnRef>
+          <a:fillRef idx="1">
+            <a:schemeClr val="lt1"/>
+          </a:fillRef>
+          <a:effectRef idx="0">
+            <a:schemeClr val="accent3"/>
+          </a:effectRef>
+          <a:fontRef idx="minor">
+            <a:schemeClr val="dk1"/>
+          </a:fontRef>
+        </p:style>
+        <p:txBody>
+          <a:bodyPr wrap="none" rtlCol="0" anchor="ctr">
+            <a:spAutoFit/>
+          </a:bodyPr>
+          <a:lstStyle/>
+          <a:p>
+            <a:pPr algn="ctr"/>
+            <a:r>
+              <a:rPr lang="en-US" sz="1200" b="1" dirty="0" err="1">
+                <a:solidFill>
+                  <a:schemeClr val="tx1"/>
+                </a:solidFill>
+              </a:rPr>
+              <a:t>QiskitCompiler</a:t>
+            </a:r>
+            <a:endParaRPr lang="en-US" sz="1200" b="1" dirty="0">
+              <a:solidFill>
+                <a:schemeClr val="tx1"/>
+              </a:solidFill>
+            </a:endParaRPr>
+          </a:p>
+        </p:txBody>
+      </p:sp>
+      <p:cxnSp>
+        <p:nvCxnSpPr>
+          <p:cNvPr id="256" name="Connector: Elbow 74">
+            <a:extLst>
+              <a:ext uri="{FF2B5EF4-FFF2-40B4-BE49-F238E27FC236}">
+                <a16:creationId xmlns:a16="http://schemas.microsoft.com/office/drawing/2014/main" id="{3096A562-4E4D-6570-4EB2-0DC23215A7F2}"/>
+              </a:ext>
+            </a:extLst>
+          </p:cNvPr>
+          <p:cNvCxnSpPr>
+            <a:cxnSpLocks/>
+            <a:stCxn id="254" idx="0"/>
+            <a:endCxn id="253" idx="2"/>
+          </p:cNvCxnSpPr>
+          <p:nvPr/>
+        </p:nvCxnSpPr>
+        <p:spPr>
+          <a:xfrm rot="16200000" flipV="1">
+            <a:off x="10412597" y="5216120"/>
+            <a:ext cx="309504" cy="675597"/>
+          </a:xfrm>
+          <a:prstGeom prst="bentConnector3">
+            <a:avLst>
+              <a:gd name="adj1" fmla="val 50000"/>
+            </a:avLst>
+          </a:prstGeom>
+          <a:ln w="19050">
+            <a:solidFill>
+              <a:schemeClr val="accent6">
+                <a:lumMod val="50000"/>
+              </a:schemeClr>
+            </a:solidFill>
+            <a:tailEnd type="triangle"/>
+          </a:ln>
+        </p:spPr>
+        <p:style>
+          <a:lnRef idx="1">
+            <a:schemeClr val="accent6"/>
+          </a:lnRef>
+          <a:fillRef idx="0">
+            <a:schemeClr val="accent6"/>
+          </a:fillRef>
+          <a:effectRef idx="0">
+            <a:schemeClr val="accent6"/>
+          </a:effectRef>
+          <a:fontRef idx="minor">
+            <a:schemeClr val="tx1"/>
+          </a:fontRef>
+        </p:style>
+      </p:cxnSp>
+      <p:cxnSp>
+        <p:nvCxnSpPr>
+          <p:cNvPr id="259" name="Connector: Elbow 74">
+            <a:extLst>
+              <a:ext uri="{FF2B5EF4-FFF2-40B4-BE49-F238E27FC236}">
+                <a16:creationId xmlns:a16="http://schemas.microsoft.com/office/drawing/2014/main" id="{06FDF315-A10D-C7C7-7B95-FA90B7C5134B}"/>
+              </a:ext>
+            </a:extLst>
+          </p:cNvPr>
+          <p:cNvCxnSpPr>
+            <a:cxnSpLocks/>
+            <a:stCxn id="255" idx="0"/>
+            <a:endCxn id="253" idx="2"/>
+          </p:cNvCxnSpPr>
+          <p:nvPr/>
+        </p:nvCxnSpPr>
+        <p:spPr>
+          <a:xfrm rot="5400000" flipH="1" flipV="1">
+            <a:off x="9775693" y="5254815"/>
+            <a:ext cx="309505" cy="598210"/>
+          </a:xfrm>
+          <a:prstGeom prst="bentConnector3">
+            <a:avLst>
+              <a:gd name="adj1" fmla="val 50000"/>
+            </a:avLst>
+          </a:prstGeom>
+          <a:ln w="19050">
+            <a:solidFill>
+              <a:schemeClr val="accent6">
+                <a:lumMod val="50000"/>
+              </a:schemeClr>
+            </a:solidFill>
+            <a:tailEnd type="triangle"/>
+          </a:ln>
+        </p:spPr>
+        <p:style>
+          <a:lnRef idx="1">
+            <a:schemeClr val="accent6"/>
+          </a:lnRef>
+          <a:fillRef idx="0">
+            <a:schemeClr val="accent6"/>
+          </a:fillRef>
+          <a:effectRef idx="0">
+            <a:schemeClr val="accent6"/>
+          </a:effectRef>
+          <a:fontRef idx="minor">
+            <a:schemeClr val="tx1"/>
+          </a:fontRef>
+        </p:style>
+      </p:cxnSp>
       <p:sp>
         <p:nvSpPr>
           <p:cNvPr id="263" name="Rectangle 262">
@@ -10211,7 +10134,7 @@
         </p:nvSpPr>
         <p:spPr>
           <a:xfrm>
-            <a:off x="296419" y="4625860"/>
+            <a:off x="417717" y="4467240"/>
             <a:ext cx="533992" cy="276999"/>
           </a:xfrm>
           <a:prstGeom prst="rect">
@@ -10274,7 +10197,7 @@
         </p:nvCxnSpPr>
         <p:spPr>
           <a:xfrm flipV="1">
-            <a:off x="830411" y="3557299"/>
+            <a:off x="951709" y="3398679"/>
             <a:ext cx="96817" cy="1207061"/>
           </a:xfrm>
           <a:prstGeom prst="bentConnector2">
@@ -10293,6 +10216,1448 @@
           </a:fillRef>
           <a:effectRef idx="0">
             <a:schemeClr val="accent1"/>
+          </a:effectRef>
+          <a:fontRef idx="minor">
+            <a:schemeClr val="tx1"/>
+          </a:fontRef>
+        </p:style>
+      </p:cxnSp>
+      <p:sp>
+        <p:nvSpPr>
+          <p:cNvPr id="36" name="Rectangle 35">
+            <a:extLst>
+              <a:ext uri="{FF2B5EF4-FFF2-40B4-BE49-F238E27FC236}">
+                <a16:creationId xmlns:a16="http://schemas.microsoft.com/office/drawing/2014/main" id="{EA4487FB-764C-95BE-AC63-963F5887DE08}"/>
+              </a:ext>
+            </a:extLst>
+          </p:cNvPr>
+          <p:cNvSpPr/>
+          <p:nvPr/>
+        </p:nvSpPr>
+        <p:spPr>
+          <a:xfrm>
+            <a:off x="5409290" y="185919"/>
+            <a:ext cx="795451" cy="276999"/>
+          </a:xfrm>
+          <a:prstGeom prst="rect">
+            <a:avLst/>
+          </a:prstGeom>
+          <a:ln w="19050"/>
+        </p:spPr>
+        <p:style>
+          <a:lnRef idx="2">
+            <a:schemeClr val="accent3"/>
+          </a:lnRef>
+          <a:fillRef idx="1">
+            <a:schemeClr val="lt1"/>
+          </a:fillRef>
+          <a:effectRef idx="0">
+            <a:schemeClr val="accent3"/>
+          </a:effectRef>
+          <a:fontRef idx="minor">
+            <a:schemeClr val="dk1"/>
+          </a:fontRef>
+        </p:style>
+        <p:txBody>
+          <a:bodyPr wrap="square" rtlCol="0" anchor="ctr">
+            <a:spAutoFit/>
+          </a:bodyPr>
+          <a:lstStyle/>
+          <a:p>
+            <a:pPr algn="ctr"/>
+            <a:r>
+              <a:rPr lang="en-US" sz="1200" b="1" dirty="0" err="1"/>
+              <a:t>Qroutine</a:t>
+            </a:r>
+            <a:endParaRPr lang="en-US" sz="1200" b="1" dirty="0"/>
+          </a:p>
+        </p:txBody>
+      </p:sp>
+      <p:cxnSp>
+        <p:nvCxnSpPr>
+          <p:cNvPr id="38" name="Connector: Elbow 87">
+            <a:extLst>
+              <a:ext uri="{FF2B5EF4-FFF2-40B4-BE49-F238E27FC236}">
+                <a16:creationId xmlns:a16="http://schemas.microsoft.com/office/drawing/2014/main" id="{E47E2B45-BCB9-E9E2-E33B-08F41F385AB0}"/>
+              </a:ext>
+            </a:extLst>
+          </p:cNvPr>
+          <p:cNvCxnSpPr>
+            <a:cxnSpLocks/>
+            <a:stCxn id="36" idx="3"/>
+            <a:endCxn id="222" idx="0"/>
+          </p:cNvCxnSpPr>
+          <p:nvPr/>
+        </p:nvCxnSpPr>
+        <p:spPr>
+          <a:xfrm>
+            <a:off x="6204741" y="324419"/>
+            <a:ext cx="1414172" cy="251714"/>
+          </a:xfrm>
+          <a:prstGeom prst="bentConnector2">
+            <a:avLst/>
+          </a:prstGeom>
+          <a:ln w="19050">
+            <a:solidFill>
+              <a:schemeClr val="accent6">
+                <a:lumMod val="50000"/>
+              </a:schemeClr>
+            </a:solidFill>
+            <a:tailEnd type="triangle"/>
+          </a:ln>
+        </p:spPr>
+        <p:style>
+          <a:lnRef idx="1">
+            <a:schemeClr val="accent6"/>
+          </a:lnRef>
+          <a:fillRef idx="0">
+            <a:schemeClr val="accent6"/>
+          </a:fillRef>
+          <a:effectRef idx="0">
+            <a:schemeClr val="accent6"/>
+          </a:effectRef>
+          <a:fontRef idx="minor">
+            <a:schemeClr val="tx1"/>
+          </a:fontRef>
+        </p:style>
+      </p:cxnSp>
+      <p:sp>
+        <p:nvSpPr>
+          <p:cNvPr id="61" name="Rectangle 60">
+            <a:extLst>
+              <a:ext uri="{FF2B5EF4-FFF2-40B4-BE49-F238E27FC236}">
+                <a16:creationId xmlns:a16="http://schemas.microsoft.com/office/drawing/2014/main" id="{AEA77758-2A62-6CB6-1053-45191BE4CA0D}"/>
+              </a:ext>
+            </a:extLst>
+          </p:cNvPr>
+          <p:cNvSpPr/>
+          <p:nvPr/>
+        </p:nvSpPr>
+        <p:spPr>
+          <a:xfrm>
+            <a:off x="4462930" y="3455632"/>
+            <a:ext cx="941608" cy="276999"/>
+          </a:xfrm>
+          <a:prstGeom prst="rect">
+            <a:avLst/>
+          </a:prstGeom>
+          <a:ln w="19050">
+            <a:solidFill>
+              <a:srgbClr val="7030A0"/>
+            </a:solidFill>
+          </a:ln>
+        </p:spPr>
+        <p:style>
+          <a:lnRef idx="2">
+            <a:schemeClr val="accent3"/>
+          </a:lnRef>
+          <a:fillRef idx="1">
+            <a:schemeClr val="lt1"/>
+          </a:fillRef>
+          <a:effectRef idx="0">
+            <a:schemeClr val="accent3"/>
+          </a:effectRef>
+          <a:fontRef idx="minor">
+            <a:schemeClr val="dk1"/>
+          </a:fontRef>
+        </p:style>
+        <p:txBody>
+          <a:bodyPr wrap="square" rtlCol="0" anchor="ctr">
+            <a:spAutoFit/>
+          </a:bodyPr>
+          <a:lstStyle/>
+          <a:p>
+            <a:pPr algn="ctr"/>
+            <a:r>
+              <a:rPr lang="en-US" sz="1200" b="1" dirty="0" err="1"/>
+              <a:t>Qatomicity</a:t>
+            </a:r>
+            <a:endParaRPr lang="en-US" sz="1200" b="1" dirty="0"/>
+          </a:p>
+        </p:txBody>
+      </p:sp>
+      <p:cxnSp>
+        <p:nvCxnSpPr>
+          <p:cNvPr id="62" name="Connector: Elbow 99">
+            <a:extLst>
+              <a:ext uri="{FF2B5EF4-FFF2-40B4-BE49-F238E27FC236}">
+                <a16:creationId xmlns:a16="http://schemas.microsoft.com/office/drawing/2014/main" id="{0F6199CE-6857-06E5-8755-7290B3BCB6F0}"/>
+              </a:ext>
+            </a:extLst>
+          </p:cNvPr>
+          <p:cNvCxnSpPr>
+            <a:cxnSpLocks/>
+            <a:stCxn id="229" idx="3"/>
+            <a:endCxn id="61" idx="1"/>
+          </p:cNvCxnSpPr>
+          <p:nvPr/>
+        </p:nvCxnSpPr>
+        <p:spPr>
+          <a:xfrm flipV="1">
+            <a:off x="4150347" y="3594132"/>
+            <a:ext cx="312583" cy="573167"/>
+          </a:xfrm>
+          <a:prstGeom prst="bentConnector3">
+            <a:avLst>
+              <a:gd name="adj1" fmla="val 50000"/>
+            </a:avLst>
+          </a:prstGeom>
+          <a:ln>
+            <a:headEnd type="none" w="lg" len="lg"/>
+            <a:tailEnd type="arrow"/>
+          </a:ln>
+        </p:spPr>
+        <p:style>
+          <a:lnRef idx="1">
+            <a:schemeClr val="accent3"/>
+          </a:lnRef>
+          <a:fillRef idx="0">
+            <a:schemeClr val="accent3"/>
+          </a:fillRef>
+          <a:effectRef idx="0">
+            <a:schemeClr val="accent3"/>
+          </a:effectRef>
+          <a:fontRef idx="minor">
+            <a:schemeClr val="tx1"/>
+          </a:fontRef>
+        </p:style>
+      </p:cxnSp>
+      <p:cxnSp>
+        <p:nvCxnSpPr>
+          <p:cNvPr id="76" name="Connector: Elbow 87">
+            <a:extLst>
+              <a:ext uri="{FF2B5EF4-FFF2-40B4-BE49-F238E27FC236}">
+                <a16:creationId xmlns:a16="http://schemas.microsoft.com/office/drawing/2014/main" id="{482463BE-B42E-1F73-0FFD-ADE47677D096}"/>
+              </a:ext>
+            </a:extLst>
+          </p:cNvPr>
+          <p:cNvCxnSpPr>
+            <a:cxnSpLocks/>
+            <a:stCxn id="61" idx="3"/>
+            <a:endCxn id="46" idx="2"/>
+          </p:cNvCxnSpPr>
+          <p:nvPr/>
+        </p:nvCxnSpPr>
+        <p:spPr>
+          <a:xfrm flipV="1">
+            <a:off x="5404538" y="3410123"/>
+            <a:ext cx="250376" cy="184009"/>
+          </a:xfrm>
+          <a:prstGeom prst="bentConnector2">
+            <a:avLst/>
+          </a:prstGeom>
+          <a:ln w="19050">
+            <a:solidFill>
+              <a:srgbClr val="7030A0"/>
+            </a:solidFill>
+            <a:tailEnd type="triangle"/>
+          </a:ln>
+        </p:spPr>
+        <p:style>
+          <a:lnRef idx="1">
+            <a:schemeClr val="accent6"/>
+          </a:lnRef>
+          <a:fillRef idx="0">
+            <a:schemeClr val="accent6"/>
+          </a:fillRef>
+          <a:effectRef idx="0">
+            <a:schemeClr val="accent6"/>
+          </a:effectRef>
+          <a:fontRef idx="minor">
+            <a:schemeClr val="tx1"/>
+          </a:fontRef>
+        </p:style>
+      </p:cxnSp>
+      <p:sp>
+        <p:nvSpPr>
+          <p:cNvPr id="177" name="Rectangle 176">
+            <a:extLst>
+              <a:ext uri="{FF2B5EF4-FFF2-40B4-BE49-F238E27FC236}">
+                <a16:creationId xmlns:a16="http://schemas.microsoft.com/office/drawing/2014/main" id="{04D014CC-4C3C-DD18-4F91-52B6988A34A3}"/>
+              </a:ext>
+            </a:extLst>
+          </p:cNvPr>
+          <p:cNvSpPr/>
+          <p:nvPr/>
+        </p:nvSpPr>
+        <p:spPr>
+          <a:xfrm>
+            <a:off x="7499050" y="4605739"/>
+            <a:ext cx="1184735" cy="276999"/>
+          </a:xfrm>
+          <a:prstGeom prst="rect">
+            <a:avLst/>
+          </a:prstGeom>
+          <a:ln w="19050">
+            <a:solidFill>
+              <a:schemeClr val="accent2">
+                <a:lumMod val="50000"/>
+              </a:schemeClr>
+            </a:solidFill>
+          </a:ln>
+        </p:spPr>
+        <p:style>
+          <a:lnRef idx="2">
+            <a:schemeClr val="accent2"/>
+          </a:lnRef>
+          <a:fillRef idx="1">
+            <a:schemeClr val="lt1"/>
+          </a:fillRef>
+          <a:effectRef idx="0">
+            <a:schemeClr val="accent2"/>
+          </a:effectRef>
+          <a:fontRef idx="minor">
+            <a:schemeClr val="dk1"/>
+          </a:fontRef>
+        </p:style>
+        <p:txBody>
+          <a:bodyPr wrap="square" rtlCol="0" anchor="ctr">
+            <a:spAutoFit/>
+          </a:bodyPr>
+          <a:lstStyle/>
+          <a:p>
+            <a:pPr algn="ctr"/>
+            <a:r>
+              <a:rPr lang="en-US" sz="1200" b="1" dirty="0" err="1"/>
+              <a:t>QadjustAdder</a:t>
+            </a:r>
+            <a:endParaRPr lang="en-US" sz="1200" b="1" dirty="0"/>
+          </a:p>
+        </p:txBody>
+      </p:sp>
+      <p:cxnSp>
+        <p:nvCxnSpPr>
+          <p:cNvPr id="179" name="Connector: Elbow 57">
+            <a:extLst>
+              <a:ext uri="{FF2B5EF4-FFF2-40B4-BE49-F238E27FC236}">
+                <a16:creationId xmlns:a16="http://schemas.microsoft.com/office/drawing/2014/main" id="{FA21CD44-97AC-A01D-4BF2-FB36DCB82627}"/>
+              </a:ext>
+            </a:extLst>
+          </p:cNvPr>
+          <p:cNvCxnSpPr>
+            <a:cxnSpLocks/>
+            <a:stCxn id="177" idx="1"/>
+            <a:endCxn id="126" idx="2"/>
+          </p:cNvCxnSpPr>
+          <p:nvPr/>
+        </p:nvCxnSpPr>
+        <p:spPr>
+          <a:xfrm rot="10800000">
+            <a:off x="7364472" y="4101071"/>
+            <a:ext cx="134579" cy="643168"/>
+          </a:xfrm>
+          <a:prstGeom prst="bentConnector2">
+            <a:avLst/>
+          </a:prstGeom>
+          <a:ln w="19050">
+            <a:solidFill>
+              <a:schemeClr val="accent2">
+                <a:lumMod val="50000"/>
+              </a:schemeClr>
+            </a:solidFill>
+            <a:tailEnd type="triangle"/>
+          </a:ln>
+        </p:spPr>
+        <p:style>
+          <a:lnRef idx="1">
+            <a:schemeClr val="accent2"/>
+          </a:lnRef>
+          <a:fillRef idx="0">
+            <a:schemeClr val="accent2"/>
+          </a:fillRef>
+          <a:effectRef idx="0">
+            <a:schemeClr val="accent2"/>
+          </a:effectRef>
+          <a:fontRef idx="minor">
+            <a:schemeClr val="tx1"/>
+          </a:fontRef>
+        </p:style>
+      </p:cxnSp>
+      <p:sp>
+        <p:nvSpPr>
+          <p:cNvPr id="215" name="Rectangle 214">
+            <a:extLst>
+              <a:ext uri="{FF2B5EF4-FFF2-40B4-BE49-F238E27FC236}">
+                <a16:creationId xmlns:a16="http://schemas.microsoft.com/office/drawing/2014/main" id="{F8D3131A-0A37-8613-21A7-ACEE44017923}"/>
+              </a:ext>
+            </a:extLst>
+          </p:cNvPr>
+          <p:cNvSpPr/>
+          <p:nvPr/>
+        </p:nvSpPr>
+        <p:spPr>
+          <a:xfrm>
+            <a:off x="1713828" y="4597969"/>
+            <a:ext cx="1199320" cy="276999"/>
+          </a:xfrm>
+          <a:prstGeom prst="rect">
+            <a:avLst/>
+          </a:prstGeom>
+          <a:ln w="19050">
+            <a:solidFill>
+              <a:srgbClr val="0070C0"/>
+            </a:solidFill>
+          </a:ln>
+        </p:spPr>
+        <p:style>
+          <a:lnRef idx="2">
+            <a:schemeClr val="accent6"/>
+          </a:lnRef>
+          <a:fillRef idx="1">
+            <a:schemeClr val="lt1"/>
+          </a:fillRef>
+          <a:effectRef idx="0">
+            <a:schemeClr val="accent6"/>
+          </a:effectRef>
+          <a:fontRef idx="minor">
+            <a:schemeClr val="dk1"/>
+          </a:fontRef>
+        </p:style>
+        <p:txBody>
+          <a:bodyPr wrap="square" rtlCol="0" anchor="ctr">
+            <a:spAutoFit/>
+          </a:bodyPr>
+          <a:lstStyle/>
+          <a:p>
+            <a:pPr algn="ctr"/>
+            <a:r>
+              <a:rPr lang="en-US" sz="1200" b="1" dirty="0" err="1"/>
+              <a:t>QnaryOperator</a:t>
+            </a:r>
+            <a:endParaRPr lang="en-US" sz="1200" b="1" dirty="0"/>
+          </a:p>
+        </p:txBody>
+      </p:sp>
+      <p:sp>
+        <p:nvSpPr>
+          <p:cNvPr id="216" name="Rectangle 215">
+            <a:extLst>
+              <a:ext uri="{FF2B5EF4-FFF2-40B4-BE49-F238E27FC236}">
+                <a16:creationId xmlns:a16="http://schemas.microsoft.com/office/drawing/2014/main" id="{E23F4A42-82D5-83F2-9A91-9FE3B62045FB}"/>
+              </a:ext>
+            </a:extLst>
+          </p:cNvPr>
+          <p:cNvSpPr/>
+          <p:nvPr/>
+        </p:nvSpPr>
+        <p:spPr>
+          <a:xfrm>
+            <a:off x="1360154" y="5582629"/>
+            <a:ext cx="844891" cy="276999"/>
+          </a:xfrm>
+          <a:prstGeom prst="rect">
+            <a:avLst/>
+          </a:prstGeom>
+          <a:ln w="19050">
+            <a:solidFill>
+              <a:srgbClr val="0070C0"/>
+            </a:solidFill>
+          </a:ln>
+        </p:spPr>
+        <p:style>
+          <a:lnRef idx="2">
+            <a:schemeClr val="accent2"/>
+          </a:lnRef>
+          <a:fillRef idx="1">
+            <a:schemeClr val="lt1"/>
+          </a:fillRef>
+          <a:effectRef idx="0">
+            <a:schemeClr val="accent2"/>
+          </a:effectRef>
+          <a:fontRef idx="minor">
+            <a:schemeClr val="dk1"/>
+          </a:fontRef>
+        </p:style>
+        <p:txBody>
+          <a:bodyPr wrap="square" rtlCol="0" anchor="ctr">
+            <a:spAutoFit/>
+          </a:bodyPr>
+          <a:lstStyle/>
+          <a:p>
+            <a:pPr algn="ctr"/>
+            <a:r>
+              <a:rPr lang="en-US" sz="1200" b="1" dirty="0" err="1"/>
+              <a:t>QnaryEq</a:t>
+            </a:r>
+            <a:endParaRPr lang="en-US" sz="1200" b="1" dirty="0"/>
+          </a:p>
+        </p:txBody>
+      </p:sp>
+      <p:cxnSp>
+        <p:nvCxnSpPr>
+          <p:cNvPr id="217" name="Connector: Elbow 57">
+            <a:extLst>
+              <a:ext uri="{FF2B5EF4-FFF2-40B4-BE49-F238E27FC236}">
+                <a16:creationId xmlns:a16="http://schemas.microsoft.com/office/drawing/2014/main" id="{6D389F35-EA75-94CC-5F21-8FB907998A44}"/>
+              </a:ext>
+            </a:extLst>
+          </p:cNvPr>
+          <p:cNvCxnSpPr>
+            <a:cxnSpLocks/>
+            <a:stCxn id="216" idx="3"/>
+            <a:endCxn id="215" idx="2"/>
+          </p:cNvCxnSpPr>
+          <p:nvPr/>
+        </p:nvCxnSpPr>
+        <p:spPr>
+          <a:xfrm flipV="1">
+            <a:off x="2205045" y="4874968"/>
+            <a:ext cx="108443" cy="846161"/>
+          </a:xfrm>
+          <a:prstGeom prst="bentConnector2">
+            <a:avLst/>
+          </a:prstGeom>
+          <a:ln w="19050">
+            <a:solidFill>
+              <a:srgbClr val="0070C0"/>
+            </a:solidFill>
+            <a:tailEnd type="triangle"/>
+          </a:ln>
+        </p:spPr>
+        <p:style>
+          <a:lnRef idx="1">
+            <a:schemeClr val="accent2"/>
+          </a:lnRef>
+          <a:fillRef idx="0">
+            <a:schemeClr val="accent2"/>
+          </a:fillRef>
+          <a:effectRef idx="0">
+            <a:schemeClr val="accent2"/>
+          </a:effectRef>
+          <a:fontRef idx="minor">
+            <a:schemeClr val="tx1"/>
+          </a:fontRef>
+        </p:style>
+      </p:cxnSp>
+      <p:sp>
+        <p:nvSpPr>
+          <p:cNvPr id="219" name="Rectangle 218">
+            <a:extLst>
+              <a:ext uri="{FF2B5EF4-FFF2-40B4-BE49-F238E27FC236}">
+                <a16:creationId xmlns:a16="http://schemas.microsoft.com/office/drawing/2014/main" id="{DC69F17E-49C0-6E27-B43E-0657BDF46395}"/>
+              </a:ext>
+            </a:extLst>
+          </p:cNvPr>
+          <p:cNvSpPr/>
+          <p:nvPr/>
+        </p:nvSpPr>
+        <p:spPr>
+          <a:xfrm>
+            <a:off x="2567837" y="4948151"/>
+            <a:ext cx="914779" cy="276999"/>
+          </a:xfrm>
+          <a:prstGeom prst="rect">
+            <a:avLst/>
+          </a:prstGeom>
+          <a:ln w="19050">
+            <a:solidFill>
+              <a:srgbClr val="0070C0"/>
+            </a:solidFill>
+          </a:ln>
+        </p:spPr>
+        <p:style>
+          <a:lnRef idx="2">
+            <a:schemeClr val="accent2"/>
+          </a:lnRef>
+          <a:fillRef idx="1">
+            <a:schemeClr val="lt1"/>
+          </a:fillRef>
+          <a:effectRef idx="0">
+            <a:schemeClr val="accent2"/>
+          </a:effectRef>
+          <a:fontRef idx="minor">
+            <a:schemeClr val="dk1"/>
+          </a:fontRef>
+        </p:style>
+        <p:txBody>
+          <a:bodyPr wrap="square" rtlCol="0" anchor="ctr">
+            <a:spAutoFit/>
+          </a:bodyPr>
+          <a:lstStyle/>
+          <a:p>
+            <a:pPr algn="ctr"/>
+            <a:r>
+              <a:rPr lang="en-US" sz="1200" b="1" dirty="0" err="1"/>
+              <a:t>QnaryNeq</a:t>
+            </a:r>
+            <a:endParaRPr lang="en-US" sz="1200" b="1" dirty="0"/>
+          </a:p>
+        </p:txBody>
+      </p:sp>
+      <p:cxnSp>
+        <p:nvCxnSpPr>
+          <p:cNvPr id="220" name="Connector: Elbow 57">
+            <a:extLst>
+              <a:ext uri="{FF2B5EF4-FFF2-40B4-BE49-F238E27FC236}">
+                <a16:creationId xmlns:a16="http://schemas.microsoft.com/office/drawing/2014/main" id="{86F36D48-103A-AFC0-A989-31838E3059E1}"/>
+              </a:ext>
+            </a:extLst>
+          </p:cNvPr>
+          <p:cNvCxnSpPr>
+            <a:cxnSpLocks/>
+            <a:stCxn id="219" idx="3"/>
+            <a:endCxn id="229" idx="2"/>
+          </p:cNvCxnSpPr>
+          <p:nvPr/>
+        </p:nvCxnSpPr>
+        <p:spPr>
+          <a:xfrm flipV="1">
+            <a:off x="3482616" y="4305798"/>
+            <a:ext cx="196927" cy="780853"/>
+          </a:xfrm>
+          <a:prstGeom prst="bentConnector2">
+            <a:avLst/>
+          </a:prstGeom>
+          <a:ln w="19050">
+            <a:solidFill>
+              <a:srgbClr val="0070C0"/>
+            </a:solidFill>
+            <a:tailEnd type="triangle"/>
+          </a:ln>
+        </p:spPr>
+        <p:style>
+          <a:lnRef idx="1">
+            <a:schemeClr val="accent2"/>
+          </a:lnRef>
+          <a:fillRef idx="0">
+            <a:schemeClr val="accent2"/>
+          </a:fillRef>
+          <a:effectRef idx="0">
+            <a:schemeClr val="accent2"/>
+          </a:effectRef>
+          <a:fontRef idx="minor">
+            <a:schemeClr val="tx1"/>
+          </a:fontRef>
+        </p:style>
+      </p:cxnSp>
+      <p:sp>
+        <p:nvSpPr>
+          <p:cNvPr id="221" name="Rectangle 220">
+            <a:extLst>
+              <a:ext uri="{FF2B5EF4-FFF2-40B4-BE49-F238E27FC236}">
+                <a16:creationId xmlns:a16="http://schemas.microsoft.com/office/drawing/2014/main" id="{79B72410-2EFE-EE63-BB42-DE3265B5492A}"/>
+              </a:ext>
+            </a:extLst>
+          </p:cNvPr>
+          <p:cNvSpPr/>
+          <p:nvPr/>
+        </p:nvSpPr>
+        <p:spPr>
+          <a:xfrm>
+            <a:off x="2758927" y="5282159"/>
+            <a:ext cx="714276" cy="276999"/>
+          </a:xfrm>
+          <a:prstGeom prst="rect">
+            <a:avLst/>
+          </a:prstGeom>
+          <a:ln w="19050">
+            <a:solidFill>
+              <a:srgbClr val="0070C0"/>
+            </a:solidFill>
+          </a:ln>
+        </p:spPr>
+        <p:style>
+          <a:lnRef idx="2">
+            <a:schemeClr val="accent2"/>
+          </a:lnRef>
+          <a:fillRef idx="1">
+            <a:schemeClr val="lt1"/>
+          </a:fillRef>
+          <a:effectRef idx="0">
+            <a:schemeClr val="accent2"/>
+          </a:effectRef>
+          <a:fontRef idx="minor">
+            <a:schemeClr val="dk1"/>
+          </a:fontRef>
+        </p:style>
+        <p:txBody>
+          <a:bodyPr wrap="square" rtlCol="0" anchor="ctr">
+            <a:spAutoFit/>
+          </a:bodyPr>
+          <a:lstStyle/>
+          <a:p>
+            <a:pPr algn="ctr"/>
+            <a:r>
+              <a:rPr lang="en-US" sz="1200" b="1" dirty="0" err="1"/>
+              <a:t>QnaryLt</a:t>
+            </a:r>
+            <a:endParaRPr lang="en-US" sz="1200" b="1" dirty="0"/>
+          </a:p>
+        </p:txBody>
+      </p:sp>
+      <p:cxnSp>
+        <p:nvCxnSpPr>
+          <p:cNvPr id="224" name="Connector: Elbow 57">
+            <a:extLst>
+              <a:ext uri="{FF2B5EF4-FFF2-40B4-BE49-F238E27FC236}">
+                <a16:creationId xmlns:a16="http://schemas.microsoft.com/office/drawing/2014/main" id="{B9BE2FA0-8D38-536A-7ABB-5CF0D5951653}"/>
+              </a:ext>
+            </a:extLst>
+          </p:cNvPr>
+          <p:cNvCxnSpPr>
+            <a:cxnSpLocks/>
+            <a:stCxn id="221" idx="3"/>
+            <a:endCxn id="229" idx="2"/>
+          </p:cNvCxnSpPr>
+          <p:nvPr/>
+        </p:nvCxnSpPr>
+        <p:spPr>
+          <a:xfrm flipV="1">
+            <a:off x="3473203" y="4305798"/>
+            <a:ext cx="206340" cy="1114861"/>
+          </a:xfrm>
+          <a:prstGeom prst="bentConnector2">
+            <a:avLst/>
+          </a:prstGeom>
+          <a:ln w="19050">
+            <a:solidFill>
+              <a:srgbClr val="0070C0"/>
+            </a:solidFill>
+            <a:tailEnd type="triangle"/>
+          </a:ln>
+        </p:spPr>
+        <p:style>
+          <a:lnRef idx="1">
+            <a:schemeClr val="accent2"/>
+          </a:lnRef>
+          <a:fillRef idx="0">
+            <a:schemeClr val="accent2"/>
+          </a:fillRef>
+          <a:effectRef idx="0">
+            <a:schemeClr val="accent2"/>
+          </a:effectRef>
+          <a:fontRef idx="minor">
+            <a:schemeClr val="tx1"/>
+          </a:fontRef>
+        </p:style>
+      </p:cxnSp>
+      <p:sp>
+        <p:nvSpPr>
+          <p:cNvPr id="225" name="Rectangle 224">
+            <a:extLst>
+              <a:ext uri="{FF2B5EF4-FFF2-40B4-BE49-F238E27FC236}">
+                <a16:creationId xmlns:a16="http://schemas.microsoft.com/office/drawing/2014/main" id="{DD60FD38-5134-C95A-0B1B-51FC608B4434}"/>
+              </a:ext>
+            </a:extLst>
+          </p:cNvPr>
+          <p:cNvSpPr/>
+          <p:nvPr/>
+        </p:nvSpPr>
+        <p:spPr>
+          <a:xfrm>
+            <a:off x="2748982" y="5599689"/>
+            <a:ext cx="724219" cy="276999"/>
+          </a:xfrm>
+          <a:prstGeom prst="rect">
+            <a:avLst/>
+          </a:prstGeom>
+          <a:ln w="19050">
+            <a:solidFill>
+              <a:srgbClr val="0070C0"/>
+            </a:solidFill>
+          </a:ln>
+        </p:spPr>
+        <p:style>
+          <a:lnRef idx="2">
+            <a:schemeClr val="accent2"/>
+          </a:lnRef>
+          <a:fillRef idx="1">
+            <a:schemeClr val="lt1"/>
+          </a:fillRef>
+          <a:effectRef idx="0">
+            <a:schemeClr val="accent2"/>
+          </a:effectRef>
+          <a:fontRef idx="minor">
+            <a:schemeClr val="dk1"/>
+          </a:fontRef>
+        </p:style>
+        <p:txBody>
+          <a:bodyPr wrap="square" rtlCol="0" anchor="ctr">
+            <a:spAutoFit/>
+          </a:bodyPr>
+          <a:lstStyle/>
+          <a:p>
+            <a:pPr algn="ctr"/>
+            <a:r>
+              <a:rPr lang="en-US" sz="1200" b="1" dirty="0" err="1"/>
+              <a:t>QnaryLe</a:t>
+            </a:r>
+            <a:endParaRPr lang="en-US" sz="1200" b="1" dirty="0"/>
+          </a:p>
+        </p:txBody>
+      </p:sp>
+      <p:cxnSp>
+        <p:nvCxnSpPr>
+          <p:cNvPr id="227" name="Connector: Elbow 57">
+            <a:extLst>
+              <a:ext uri="{FF2B5EF4-FFF2-40B4-BE49-F238E27FC236}">
+                <a16:creationId xmlns:a16="http://schemas.microsoft.com/office/drawing/2014/main" id="{CF57449E-76E0-62CD-4521-95FB0D222D0E}"/>
+              </a:ext>
+            </a:extLst>
+          </p:cNvPr>
+          <p:cNvCxnSpPr>
+            <a:cxnSpLocks/>
+            <a:stCxn id="225" idx="3"/>
+            <a:endCxn id="229" idx="2"/>
+          </p:cNvCxnSpPr>
+          <p:nvPr/>
+        </p:nvCxnSpPr>
+        <p:spPr>
+          <a:xfrm flipV="1">
+            <a:off x="3473201" y="4305798"/>
+            <a:ext cx="206342" cy="1432391"/>
+          </a:xfrm>
+          <a:prstGeom prst="bentConnector2">
+            <a:avLst/>
+          </a:prstGeom>
+          <a:ln w="19050">
+            <a:solidFill>
+              <a:srgbClr val="0070C0"/>
+            </a:solidFill>
+            <a:tailEnd type="triangle"/>
+          </a:ln>
+        </p:spPr>
+        <p:style>
+          <a:lnRef idx="1">
+            <a:schemeClr val="accent2"/>
+          </a:lnRef>
+          <a:fillRef idx="0">
+            <a:schemeClr val="accent2"/>
+          </a:fillRef>
+          <a:effectRef idx="0">
+            <a:schemeClr val="accent2"/>
+          </a:effectRef>
+          <a:fontRef idx="minor">
+            <a:schemeClr val="tx1"/>
+          </a:fontRef>
+        </p:style>
+      </p:cxnSp>
+      <p:sp>
+        <p:nvSpPr>
+          <p:cNvPr id="228" name="Rectangle 227">
+            <a:extLst>
+              <a:ext uri="{FF2B5EF4-FFF2-40B4-BE49-F238E27FC236}">
+                <a16:creationId xmlns:a16="http://schemas.microsoft.com/office/drawing/2014/main" id="{12895361-5F57-7BA9-E207-164252075F22}"/>
+              </a:ext>
+            </a:extLst>
+          </p:cNvPr>
+          <p:cNvSpPr/>
+          <p:nvPr/>
+        </p:nvSpPr>
+        <p:spPr>
+          <a:xfrm>
+            <a:off x="2651649" y="5939151"/>
+            <a:ext cx="821551" cy="276999"/>
+          </a:xfrm>
+          <a:prstGeom prst="rect">
+            <a:avLst/>
+          </a:prstGeom>
+          <a:ln w="19050">
+            <a:solidFill>
+              <a:srgbClr val="0070C0"/>
+            </a:solidFill>
+          </a:ln>
+        </p:spPr>
+        <p:style>
+          <a:lnRef idx="2">
+            <a:schemeClr val="accent2"/>
+          </a:lnRef>
+          <a:fillRef idx="1">
+            <a:schemeClr val="lt1"/>
+          </a:fillRef>
+          <a:effectRef idx="0">
+            <a:schemeClr val="accent2"/>
+          </a:effectRef>
+          <a:fontRef idx="minor">
+            <a:schemeClr val="dk1"/>
+          </a:fontRef>
+        </p:style>
+        <p:txBody>
+          <a:bodyPr wrap="square" rtlCol="0" anchor="ctr">
+            <a:spAutoFit/>
+          </a:bodyPr>
+          <a:lstStyle/>
+          <a:p>
+            <a:pPr algn="ctr"/>
+            <a:r>
+              <a:rPr lang="en-US" sz="1200" b="1" dirty="0" err="1"/>
+              <a:t>QnaryGt</a:t>
+            </a:r>
+            <a:endParaRPr lang="en-US" sz="1200" b="1" dirty="0"/>
+          </a:p>
+        </p:txBody>
+      </p:sp>
+      <p:cxnSp>
+        <p:nvCxnSpPr>
+          <p:cNvPr id="232" name="Connector: Elbow 57">
+            <a:extLst>
+              <a:ext uri="{FF2B5EF4-FFF2-40B4-BE49-F238E27FC236}">
+                <a16:creationId xmlns:a16="http://schemas.microsoft.com/office/drawing/2014/main" id="{600F7C75-E236-3A30-E9D3-F22D1AFB5D06}"/>
+              </a:ext>
+            </a:extLst>
+          </p:cNvPr>
+          <p:cNvCxnSpPr>
+            <a:cxnSpLocks/>
+            <a:stCxn id="228" idx="3"/>
+            <a:endCxn id="229" idx="2"/>
+          </p:cNvCxnSpPr>
+          <p:nvPr/>
+        </p:nvCxnSpPr>
+        <p:spPr>
+          <a:xfrm flipV="1">
+            <a:off x="3473200" y="4305798"/>
+            <a:ext cx="206343" cy="1771853"/>
+          </a:xfrm>
+          <a:prstGeom prst="bentConnector2">
+            <a:avLst/>
+          </a:prstGeom>
+          <a:ln w="19050">
+            <a:solidFill>
+              <a:srgbClr val="0070C0"/>
+            </a:solidFill>
+            <a:tailEnd type="triangle"/>
+          </a:ln>
+        </p:spPr>
+        <p:style>
+          <a:lnRef idx="1">
+            <a:schemeClr val="accent2"/>
+          </a:lnRef>
+          <a:fillRef idx="0">
+            <a:schemeClr val="accent2"/>
+          </a:fillRef>
+          <a:effectRef idx="0">
+            <a:schemeClr val="accent2"/>
+          </a:effectRef>
+          <a:fontRef idx="minor">
+            <a:schemeClr val="tx1"/>
+          </a:fontRef>
+        </p:style>
+      </p:cxnSp>
+      <p:sp>
+        <p:nvSpPr>
+          <p:cNvPr id="233" name="Rectangle 232">
+            <a:extLst>
+              <a:ext uri="{FF2B5EF4-FFF2-40B4-BE49-F238E27FC236}">
+                <a16:creationId xmlns:a16="http://schemas.microsoft.com/office/drawing/2014/main" id="{78CEE37C-26E0-B2BB-3457-9BE109CFF696}"/>
+              </a:ext>
+            </a:extLst>
+          </p:cNvPr>
+          <p:cNvSpPr/>
+          <p:nvPr/>
+        </p:nvSpPr>
+        <p:spPr>
+          <a:xfrm>
+            <a:off x="2651649" y="6242555"/>
+            <a:ext cx="821552" cy="276999"/>
+          </a:xfrm>
+          <a:prstGeom prst="rect">
+            <a:avLst/>
+          </a:prstGeom>
+          <a:ln w="19050">
+            <a:solidFill>
+              <a:srgbClr val="0070C0"/>
+            </a:solidFill>
+          </a:ln>
+        </p:spPr>
+        <p:style>
+          <a:lnRef idx="2">
+            <a:schemeClr val="accent2"/>
+          </a:lnRef>
+          <a:fillRef idx="1">
+            <a:schemeClr val="lt1"/>
+          </a:fillRef>
+          <a:effectRef idx="0">
+            <a:schemeClr val="accent2"/>
+          </a:effectRef>
+          <a:fontRef idx="minor">
+            <a:schemeClr val="dk1"/>
+          </a:fontRef>
+        </p:style>
+        <p:txBody>
+          <a:bodyPr wrap="square" rtlCol="0" anchor="ctr">
+            <a:spAutoFit/>
+          </a:bodyPr>
+          <a:lstStyle/>
+          <a:p>
+            <a:pPr algn="ctr"/>
+            <a:r>
+              <a:rPr lang="en-US" sz="1200" b="1" dirty="0" err="1"/>
+              <a:t>QnaryGe</a:t>
+            </a:r>
+            <a:endParaRPr lang="en-US" sz="1200" b="1" dirty="0"/>
+          </a:p>
+        </p:txBody>
+      </p:sp>
+      <p:cxnSp>
+        <p:nvCxnSpPr>
+          <p:cNvPr id="235" name="Connector: Elbow 57">
+            <a:extLst>
+              <a:ext uri="{FF2B5EF4-FFF2-40B4-BE49-F238E27FC236}">
+                <a16:creationId xmlns:a16="http://schemas.microsoft.com/office/drawing/2014/main" id="{B6243E7F-9F28-D3B6-A228-C23C24F74FC9}"/>
+              </a:ext>
+            </a:extLst>
+          </p:cNvPr>
+          <p:cNvCxnSpPr>
+            <a:cxnSpLocks/>
+            <a:stCxn id="233" idx="3"/>
+            <a:endCxn id="229" idx="2"/>
+          </p:cNvCxnSpPr>
+          <p:nvPr/>
+        </p:nvCxnSpPr>
+        <p:spPr>
+          <a:xfrm flipV="1">
+            <a:off x="3473201" y="4305798"/>
+            <a:ext cx="206342" cy="2075257"/>
+          </a:xfrm>
+          <a:prstGeom prst="bentConnector2">
+            <a:avLst/>
+          </a:prstGeom>
+          <a:ln w="19050">
+            <a:solidFill>
+              <a:srgbClr val="0070C0"/>
+            </a:solidFill>
+            <a:tailEnd type="triangle"/>
+          </a:ln>
+        </p:spPr>
+        <p:style>
+          <a:lnRef idx="1">
+            <a:schemeClr val="accent2"/>
+          </a:lnRef>
+          <a:fillRef idx="0">
+            <a:schemeClr val="accent2"/>
+          </a:fillRef>
+          <a:effectRef idx="0">
+            <a:schemeClr val="accent2"/>
+          </a:effectRef>
+          <a:fontRef idx="minor">
+            <a:schemeClr val="tx1"/>
+          </a:fontRef>
+        </p:style>
+      </p:cxnSp>
+      <p:cxnSp>
+        <p:nvCxnSpPr>
+          <p:cNvPr id="244" name="Connector: Elbow 67">
+            <a:extLst>
+              <a:ext uri="{FF2B5EF4-FFF2-40B4-BE49-F238E27FC236}">
+                <a16:creationId xmlns:a16="http://schemas.microsoft.com/office/drawing/2014/main" id="{6D601583-92A8-DCAF-C9C5-265AE23F3DFA}"/>
+              </a:ext>
+            </a:extLst>
+          </p:cNvPr>
+          <p:cNvCxnSpPr>
+            <a:cxnSpLocks/>
+            <a:stCxn id="215" idx="3"/>
+            <a:endCxn id="45" idx="2"/>
+          </p:cNvCxnSpPr>
+          <p:nvPr/>
+        </p:nvCxnSpPr>
+        <p:spPr>
+          <a:xfrm flipV="1">
+            <a:off x="2913148" y="3441207"/>
+            <a:ext cx="64813" cy="1295262"/>
+          </a:xfrm>
+          <a:prstGeom prst="bentConnector2">
+            <a:avLst/>
+          </a:prstGeom>
+          <a:ln w="19050">
+            <a:solidFill>
+              <a:srgbClr val="0070C0"/>
+            </a:solidFill>
+            <a:tailEnd type="triangle"/>
+          </a:ln>
+        </p:spPr>
+        <p:style>
+          <a:lnRef idx="1">
+            <a:schemeClr val="accent6"/>
+          </a:lnRef>
+          <a:fillRef idx="0">
+            <a:schemeClr val="accent6"/>
+          </a:fillRef>
+          <a:effectRef idx="0">
+            <a:schemeClr val="accent6"/>
+          </a:effectRef>
+          <a:fontRef idx="minor">
+            <a:schemeClr val="tx1"/>
+          </a:fontRef>
+        </p:style>
+      </p:cxnSp>
+      <p:sp>
+        <p:nvSpPr>
+          <p:cNvPr id="291" name="Rectangle 290">
+            <a:extLst>
+              <a:ext uri="{FF2B5EF4-FFF2-40B4-BE49-F238E27FC236}">
+                <a16:creationId xmlns:a16="http://schemas.microsoft.com/office/drawing/2014/main" id="{4D137FDA-2DC7-FC6F-87F5-709EB06C07CC}"/>
+              </a:ext>
+            </a:extLst>
+          </p:cNvPr>
+          <p:cNvSpPr/>
+          <p:nvPr/>
+        </p:nvSpPr>
+        <p:spPr>
+          <a:xfrm>
+            <a:off x="1215984" y="5932801"/>
+            <a:ext cx="982195" cy="276999"/>
+          </a:xfrm>
+          <a:prstGeom prst="rect">
+            <a:avLst/>
+          </a:prstGeom>
+          <a:ln w="19050">
+            <a:solidFill>
+              <a:srgbClr val="0070C0"/>
+            </a:solidFill>
+          </a:ln>
+        </p:spPr>
+        <p:style>
+          <a:lnRef idx="2">
+            <a:schemeClr val="accent2"/>
+          </a:lnRef>
+          <a:fillRef idx="1">
+            <a:schemeClr val="lt1"/>
+          </a:fillRef>
+          <a:effectRef idx="0">
+            <a:schemeClr val="accent2"/>
+          </a:effectRef>
+          <a:fontRef idx="minor">
+            <a:schemeClr val="dk1"/>
+          </a:fontRef>
+        </p:style>
+        <p:txBody>
+          <a:bodyPr wrap="square" rtlCol="0" anchor="ctr">
+            <a:spAutoFit/>
+          </a:bodyPr>
+          <a:lstStyle/>
+          <a:p>
+            <a:pPr algn="ctr"/>
+            <a:r>
+              <a:rPr lang="en-US" sz="1200" b="1" dirty="0" err="1"/>
+              <a:t>QnaryInvert</a:t>
+            </a:r>
+            <a:endParaRPr lang="en-US" sz="1200" b="1" dirty="0"/>
+          </a:p>
+        </p:txBody>
+      </p:sp>
+      <p:cxnSp>
+        <p:nvCxnSpPr>
+          <p:cNvPr id="292" name="Connector: Elbow 57">
+            <a:extLst>
+              <a:ext uri="{FF2B5EF4-FFF2-40B4-BE49-F238E27FC236}">
+                <a16:creationId xmlns:a16="http://schemas.microsoft.com/office/drawing/2014/main" id="{69B40255-B65D-0735-9045-B77890795F4E}"/>
+              </a:ext>
+            </a:extLst>
+          </p:cNvPr>
+          <p:cNvCxnSpPr>
+            <a:cxnSpLocks/>
+            <a:stCxn id="291" idx="3"/>
+            <a:endCxn id="215" idx="2"/>
+          </p:cNvCxnSpPr>
+          <p:nvPr/>
+        </p:nvCxnSpPr>
+        <p:spPr>
+          <a:xfrm flipV="1">
+            <a:off x="2198179" y="4874968"/>
+            <a:ext cx="115309" cy="1196333"/>
+          </a:xfrm>
+          <a:prstGeom prst="bentConnector2">
+            <a:avLst/>
+          </a:prstGeom>
+          <a:ln w="19050">
+            <a:solidFill>
+              <a:srgbClr val="0070C0"/>
+            </a:solidFill>
+            <a:tailEnd type="triangle"/>
+          </a:ln>
+        </p:spPr>
+        <p:style>
+          <a:lnRef idx="1">
+            <a:schemeClr val="accent2"/>
+          </a:lnRef>
+          <a:fillRef idx="0">
+            <a:schemeClr val="accent2"/>
+          </a:fillRef>
+          <a:effectRef idx="0">
+            <a:schemeClr val="accent2"/>
+          </a:effectRef>
+          <a:fontRef idx="minor">
+            <a:schemeClr val="tx1"/>
+          </a:fontRef>
+        </p:style>
+      </p:cxnSp>
+      <p:sp>
+        <p:nvSpPr>
+          <p:cNvPr id="295" name="Rectangle 294">
+            <a:extLst>
+              <a:ext uri="{FF2B5EF4-FFF2-40B4-BE49-F238E27FC236}">
+                <a16:creationId xmlns:a16="http://schemas.microsoft.com/office/drawing/2014/main" id="{3A1F484A-C8C0-4915-05D6-F5AEF5AA27AE}"/>
+              </a:ext>
+            </a:extLst>
+          </p:cNvPr>
+          <p:cNvSpPr/>
+          <p:nvPr/>
+        </p:nvSpPr>
+        <p:spPr>
+          <a:xfrm>
+            <a:off x="5334966" y="6259460"/>
+            <a:ext cx="982195" cy="276999"/>
+          </a:xfrm>
+          <a:prstGeom prst="rect">
+            <a:avLst/>
+          </a:prstGeom>
+          <a:ln w="19050">
+            <a:solidFill>
+              <a:srgbClr val="00B0F0"/>
+            </a:solidFill>
+          </a:ln>
+        </p:spPr>
+        <p:style>
+          <a:lnRef idx="2">
+            <a:schemeClr val="accent2"/>
+          </a:lnRef>
+          <a:fillRef idx="1">
+            <a:schemeClr val="lt1"/>
+          </a:fillRef>
+          <a:effectRef idx="0">
+            <a:schemeClr val="accent2"/>
+          </a:effectRef>
+          <a:fontRef idx="minor">
+            <a:schemeClr val="dk1"/>
+          </a:fontRef>
+        </p:style>
+        <p:txBody>
+          <a:bodyPr wrap="square" rtlCol="0" anchor="ctr">
+            <a:spAutoFit/>
+          </a:bodyPr>
+          <a:lstStyle/>
+          <a:p>
+            <a:pPr algn="ctr"/>
+            <a:r>
+              <a:rPr lang="en-US" sz="1200" b="1" dirty="0" err="1"/>
+              <a:t>Qinvert</a:t>
+            </a:r>
+            <a:endParaRPr lang="en-US" sz="1200" b="1" dirty="0"/>
+          </a:p>
+        </p:txBody>
+      </p:sp>
+      <p:cxnSp>
+        <p:nvCxnSpPr>
+          <p:cNvPr id="296" name="Connector: Elbow 57">
+            <a:extLst>
+              <a:ext uri="{FF2B5EF4-FFF2-40B4-BE49-F238E27FC236}">
+                <a16:creationId xmlns:a16="http://schemas.microsoft.com/office/drawing/2014/main" id="{4867980C-2EEE-733C-582B-32E8EC26391D}"/>
+              </a:ext>
+            </a:extLst>
+          </p:cNvPr>
+          <p:cNvCxnSpPr>
+            <a:cxnSpLocks/>
+            <a:stCxn id="295" idx="3"/>
+            <a:endCxn id="77" idx="2"/>
+          </p:cNvCxnSpPr>
+          <p:nvPr/>
+        </p:nvCxnSpPr>
+        <p:spPr>
+          <a:xfrm flipV="1">
+            <a:off x="6317161" y="4101071"/>
+            <a:ext cx="85082" cy="2296889"/>
+          </a:xfrm>
+          <a:prstGeom prst="bentConnector2">
+            <a:avLst/>
+          </a:prstGeom>
+          <a:ln w="19050">
+            <a:solidFill>
+              <a:srgbClr val="00B0F0"/>
+            </a:solidFill>
+            <a:tailEnd type="triangle"/>
+          </a:ln>
+        </p:spPr>
+        <p:style>
+          <a:lnRef idx="1">
+            <a:schemeClr val="accent2"/>
+          </a:lnRef>
+          <a:fillRef idx="0">
+            <a:schemeClr val="accent2"/>
+          </a:fillRef>
+          <a:effectRef idx="0">
+            <a:schemeClr val="accent2"/>
+          </a:effectRef>
+          <a:fontRef idx="minor">
+            <a:schemeClr val="tx1"/>
+          </a:fontRef>
+        </p:style>
+      </p:cxnSp>
+      <p:grpSp>
+        <p:nvGrpSpPr>
+          <p:cNvPr id="322" name="Group 321">
+            <a:extLst>
+              <a:ext uri="{FF2B5EF4-FFF2-40B4-BE49-F238E27FC236}">
+                <a16:creationId xmlns:a16="http://schemas.microsoft.com/office/drawing/2014/main" id="{13EF0747-18B3-EB7C-4110-9F337333E9ED}"/>
+              </a:ext>
+            </a:extLst>
+          </p:cNvPr>
+          <p:cNvGrpSpPr/>
+          <p:nvPr/>
+        </p:nvGrpSpPr>
+        <p:grpSpPr>
+          <a:xfrm>
+            <a:off x="3145130" y="3289831"/>
+            <a:ext cx="1147620" cy="513078"/>
+            <a:chOff x="6646286" y="1757230"/>
+            <a:chExt cx="1147620" cy="513078"/>
+          </a:xfrm>
+        </p:grpSpPr>
+        <p:sp>
+          <p:nvSpPr>
+            <p:cNvPr id="323" name="Rectangle 322">
+              <a:extLst>
+                <a:ext uri="{FF2B5EF4-FFF2-40B4-BE49-F238E27FC236}">
+                  <a16:creationId xmlns:a16="http://schemas.microsoft.com/office/drawing/2014/main" id="{B3A2F2A4-830B-5FE7-2193-AA2C6A5B93B7}"/>
+                </a:ext>
+              </a:extLst>
+            </p:cNvPr>
+            <p:cNvSpPr/>
+            <p:nvPr/>
+          </p:nvSpPr>
+          <p:spPr>
+            <a:xfrm>
+              <a:off x="6646286" y="1993309"/>
+              <a:ext cx="889091" cy="276999"/>
+            </a:xfrm>
+            <a:prstGeom prst="rect">
+              <a:avLst/>
+            </a:prstGeom>
+            <a:ln w="19050"/>
+          </p:spPr>
+          <p:style>
+            <a:lnRef idx="2">
+              <a:schemeClr val="accent3"/>
+            </a:lnRef>
+            <a:fillRef idx="1">
+              <a:schemeClr val="lt1"/>
+            </a:fillRef>
+            <a:effectRef idx="0">
+              <a:schemeClr val="accent3"/>
+            </a:effectRef>
+            <a:fontRef idx="minor">
+              <a:schemeClr val="dk1"/>
+            </a:fontRef>
+          </p:style>
+          <p:txBody>
+            <a:bodyPr wrap="none" rtlCol="0" anchor="ctr">
+              <a:spAutoFit/>
+            </a:bodyPr>
+            <a:lstStyle/>
+            <a:p>
+              <a:pPr algn="ctr"/>
+              <a:r>
+                <a:rPr lang="en-US" sz="1200" b="1" dirty="0" err="1">
+                  <a:solidFill>
+                    <a:schemeClr val="dk1"/>
+                  </a:solidFill>
+                </a:rPr>
+                <a:t>QnaryBiOp</a:t>
+              </a:r>
+              <a:endParaRPr lang="en-US" sz="1200" b="1" dirty="0">
+                <a:solidFill>
+                  <a:schemeClr val="dk1"/>
+                </a:solidFill>
+              </a:endParaRPr>
+            </a:p>
+          </p:txBody>
+        </p:sp>
+        <p:sp>
+          <p:nvSpPr>
+            <p:cNvPr id="324" name="Rectangle: Rounded Corners 323">
+              <a:extLst>
+                <a:ext uri="{FF2B5EF4-FFF2-40B4-BE49-F238E27FC236}">
+                  <a16:creationId xmlns:a16="http://schemas.microsoft.com/office/drawing/2014/main" id="{A36A4C30-CEC1-778A-A59F-82C63A801DCD}"/>
+                </a:ext>
+              </a:extLst>
+            </p:cNvPr>
+            <p:cNvSpPr/>
+            <p:nvPr/>
+          </p:nvSpPr>
+          <p:spPr>
+            <a:xfrm>
+              <a:off x="7070956" y="1757230"/>
+              <a:ext cx="722950" cy="306467"/>
+            </a:xfrm>
+            <a:prstGeom prst="roundRect">
+              <a:avLst/>
+            </a:prstGeom>
+            <a:ln w="19050"/>
+          </p:spPr>
+          <p:style>
+            <a:lnRef idx="2">
+              <a:schemeClr val="accent3"/>
+            </a:lnRef>
+            <a:fillRef idx="1">
+              <a:schemeClr val="lt1"/>
+            </a:fillRef>
+            <a:effectRef idx="0">
+              <a:schemeClr val="accent3"/>
+            </a:effectRef>
+            <a:fontRef idx="minor">
+              <a:schemeClr val="dk1"/>
+            </a:fontRef>
+          </p:style>
+          <p:txBody>
+            <a:bodyPr wrap="none" rtlCol="0" anchor="ctr">
+              <a:spAutoFit/>
+            </a:bodyPr>
+            <a:lstStyle/>
+            <a:p>
+              <a:pPr algn="ctr"/>
+              <a:r>
+                <a:rPr lang="en-US" sz="1200" b="1" dirty="0" err="1">
+                  <a:solidFill>
+                    <a:schemeClr val="accent1"/>
+                  </a:solidFill>
+                </a:rPr>
+                <a:t>QcellOp</a:t>
+              </a:r>
+              <a:endParaRPr lang="en-US" sz="1200" b="1" dirty="0">
+                <a:solidFill>
+                  <a:schemeClr val="accent1"/>
+                </a:solidFill>
+              </a:endParaRPr>
+            </a:p>
+          </p:txBody>
+        </p:sp>
+      </p:grpSp>
+      <p:cxnSp>
+        <p:nvCxnSpPr>
+          <p:cNvPr id="325" name="Connector: Elbow 67">
+            <a:extLst>
+              <a:ext uri="{FF2B5EF4-FFF2-40B4-BE49-F238E27FC236}">
+                <a16:creationId xmlns:a16="http://schemas.microsoft.com/office/drawing/2014/main" id="{744B8192-8488-2AFE-0A28-6BB4319C62AC}"/>
+              </a:ext>
+            </a:extLst>
+          </p:cNvPr>
+          <p:cNvCxnSpPr>
+            <a:cxnSpLocks/>
+            <a:stCxn id="323" idx="1"/>
+            <a:endCxn id="45" idx="2"/>
+          </p:cNvCxnSpPr>
+          <p:nvPr/>
+        </p:nvCxnSpPr>
+        <p:spPr>
+          <a:xfrm rot="10800000">
+            <a:off x="2977962" y="3441208"/>
+            <a:ext cx="167169" cy="223203"/>
+          </a:xfrm>
+          <a:prstGeom prst="bentConnector2">
+            <a:avLst/>
+          </a:prstGeom>
+          <a:ln w="19050">
+            <a:tailEnd type="triangle"/>
+          </a:ln>
+        </p:spPr>
+        <p:style>
+          <a:lnRef idx="1">
+            <a:schemeClr val="accent6"/>
+          </a:lnRef>
+          <a:fillRef idx="0">
+            <a:schemeClr val="accent6"/>
+          </a:fillRef>
+          <a:effectRef idx="0">
+            <a:schemeClr val="accent6"/>
           </a:effectRef>
           <a:fontRef idx="minor">
             <a:schemeClr val="tx1"/>

</xml_diff>